<commit_message>
final presentation on 06.02.2015
</commit_message>
<xml_diff>
--- a/UGNM_Instantmessaging/doc/PresentationIM.pptx
+++ b/UGNM_Instantmessaging/doc/PresentationIM.pptx
@@ -5,7 +5,7 @@
     <p:sldMasterId id="2147483648" r:id="rId1"/>
   </p:sldMasterIdLst>
   <p:notesMasterIdLst>
-    <p:notesMasterId r:id="rId7"/>
+    <p:notesMasterId r:id="rId12"/>
   </p:notesMasterIdLst>
   <p:sldIdLst>
     <p:sldId id="256" r:id="rId2"/>
@@ -13,6 +13,11 @@
     <p:sldId id="260" r:id="rId4"/>
     <p:sldId id="261" r:id="rId5"/>
     <p:sldId id="263" r:id="rId6"/>
+    <p:sldId id="268" r:id="rId7"/>
+    <p:sldId id="264" r:id="rId8"/>
+    <p:sldId id="265" r:id="rId9"/>
+    <p:sldId id="266" r:id="rId10"/>
+    <p:sldId id="267" r:id="rId11"/>
   </p:sldIdLst>
   <p:sldSz cx="9144000" cy="6858000" type="screen4x3"/>
   <p:notesSz cx="6858000" cy="9144000"/>
@@ -1762,15 +1767,7 @@
                 <a:srgbClr val="3C536F"/>
               </a:solidFill>
             </a:rPr>
-            <a:t>code available for </a:t>
-          </a:r>
-          <a:r>
-            <a:rPr lang="en-US" sz="1800" b="1" dirty="0" smtClean="0">
-              <a:solidFill>
-                <a:srgbClr val="3C536F"/>
-              </a:solidFill>
-            </a:rPr>
-            <a:t>reuse</a:t>
+            <a:t>code available for reuse</a:t>
           </a:r>
           <a:endParaRPr lang="en-US" sz="1800" b="1" dirty="0">
             <a:solidFill>
@@ -2380,12 +2377,20 @@
         <a:p>
           <a:pPr algn="l"/>
           <a:r>
+            <a:rPr lang="en-US" sz="2000" b="0" dirty="0" err="1" smtClean="0">
+              <a:solidFill>
+                <a:schemeClr val="tx1"/>
+              </a:solidFill>
+            </a:rPr>
+            <a:t>Seaching</a:t>
+          </a:r>
+          <a:r>
             <a:rPr lang="en-US" sz="2000" b="0" dirty="0" smtClean="0">
               <a:solidFill>
                 <a:schemeClr val="tx1"/>
               </a:solidFill>
             </a:rPr>
-            <a:t>Search history with key words</a:t>
+            <a:t> history with key words</a:t>
           </a:r>
           <a:endParaRPr lang="en-US" sz="2000" b="0" dirty="0">
             <a:solidFill>
@@ -2544,15 +2549,7 @@
                 <a:schemeClr val="tx1"/>
               </a:solidFill>
             </a:rPr>
-            <a:t>Integration with other </a:t>
-          </a:r>
-          <a:r>
-            <a:rPr lang="en-US" sz="2000" b="0" dirty="0" smtClean="0">
-              <a:solidFill>
-                <a:schemeClr val="tx1"/>
-              </a:solidFill>
-            </a:rPr>
-            <a:t>services like IRC </a:t>
+            <a:t>Integration with other services like IRC </a:t>
           </a:r>
           <a:endParaRPr lang="en-US" sz="2000" b="0" dirty="0">
             <a:solidFill>
@@ -3030,15 +3027,7 @@
                 <a:srgbClr val="3C536F"/>
               </a:solidFill>
             </a:rPr>
-            <a:t>code available for </a:t>
-          </a:r>
-          <a:r>
-            <a:rPr lang="en-US" sz="1800" b="1" kern="1200" dirty="0" smtClean="0">
-              <a:solidFill>
-                <a:srgbClr val="3C536F"/>
-              </a:solidFill>
-            </a:rPr>
-            <a:t>reuse</a:t>
+            <a:t>code available for reuse</a:t>
           </a:r>
           <a:endParaRPr lang="en-US" sz="1800" b="1" kern="1200" dirty="0">
             <a:solidFill>
@@ -3636,12 +3625,20 @@
             </a:spcAft>
           </a:pPr>
           <a:r>
+            <a:rPr lang="en-US" sz="2000" b="0" kern="1200" dirty="0" err="1" smtClean="0">
+              <a:solidFill>
+                <a:schemeClr val="tx1"/>
+              </a:solidFill>
+            </a:rPr>
+            <a:t>Seaching</a:t>
+          </a:r>
+          <a:r>
             <a:rPr lang="en-US" sz="2000" b="0" kern="1200" dirty="0" smtClean="0">
               <a:solidFill>
                 <a:schemeClr val="tx1"/>
               </a:solidFill>
             </a:rPr>
-            <a:t>Search history with key words</a:t>
+            <a:t> history with key words</a:t>
           </a:r>
           <a:endParaRPr lang="en-US" sz="2000" b="0" kern="1200" dirty="0">
             <a:solidFill>
@@ -3986,15 +3983,7 @@
                 <a:schemeClr val="tx1"/>
               </a:solidFill>
             </a:rPr>
-            <a:t>Integration with other </a:t>
-          </a:r>
-          <a:r>
-            <a:rPr lang="en-US" sz="2000" b="0" kern="1200" dirty="0" smtClean="0">
-              <a:solidFill>
-                <a:schemeClr val="tx1"/>
-              </a:solidFill>
-            </a:rPr>
-            <a:t>services like IRC </a:t>
+            <a:t>Integration with other services like IRC </a:t>
           </a:r>
           <a:endParaRPr lang="en-US" sz="2000" b="0" kern="1200" dirty="0">
             <a:solidFill>
@@ -8127,7 +8116,7 @@
           <a:p>
             <a:fld id="{25311B48-C320-4C6B-A4ED-882654EB857D}" type="datetimeFigureOut">
               <a:rPr lang="en-US" smtClean="0"/>
-              <a:t>2/3/2015</a:t>
+              <a:t>2/6/2015</a:t>
             </a:fld>
             <a:endParaRPr lang="en-US"/>
           </a:p>
@@ -8393,6 +8382,90 @@
     </a:lvl9pPr>
   </p:notesStyle>
 </p:notesMaster>
+</file>
+
+<file path=ppt/notesSlides/notesSlide1.xml><?xml version="1.0" encoding="utf-8"?>
+<p:notes xmlns:a="http://schemas.openxmlformats.org/drawingml/2006/main" xmlns:r="http://schemas.openxmlformats.org/officeDocument/2006/relationships" xmlns:p="http://schemas.openxmlformats.org/presentationml/2006/main">
+  <p:cSld>
+    <p:spTree>
+      <p:nvGrpSpPr>
+        <p:cNvPr id="1" name=""/>
+        <p:cNvGrpSpPr/>
+        <p:nvPr/>
+      </p:nvGrpSpPr>
+      <p:grpSpPr>
+        <a:xfrm>
+          <a:off x="0" y="0"/>
+          <a:ext cx="0" cy="0"/>
+          <a:chOff x="0" y="0"/>
+          <a:chExt cx="0" cy="0"/>
+        </a:xfrm>
+      </p:grpSpPr>
+      <p:sp>
+        <p:nvSpPr>
+          <p:cNvPr id="2" name="Slide Image Placeholder 1"/>
+          <p:cNvSpPr>
+            <a:spLocks noGrp="1" noRot="1" noChangeAspect="1"/>
+          </p:cNvSpPr>
+          <p:nvPr>
+            <p:ph type="sldImg"/>
+          </p:nvPr>
+        </p:nvSpPr>
+        <p:spPr/>
+      </p:sp>
+      <p:sp>
+        <p:nvSpPr>
+          <p:cNvPr id="3" name="Notes Placeholder 2"/>
+          <p:cNvSpPr>
+            <a:spLocks noGrp="1"/>
+          </p:cNvSpPr>
+          <p:nvPr>
+            <p:ph type="body" idx="1"/>
+          </p:nvPr>
+        </p:nvSpPr>
+        <p:spPr/>
+        <p:txBody>
+          <a:bodyPr/>
+          <a:lstStyle/>
+          <a:p>
+            <a:endParaRPr lang="en-US" dirty="0"/>
+          </a:p>
+        </p:txBody>
+      </p:sp>
+      <p:sp>
+        <p:nvSpPr>
+          <p:cNvPr id="4" name="Slide Number Placeholder 3"/>
+          <p:cNvSpPr>
+            <a:spLocks noGrp="1"/>
+          </p:cNvSpPr>
+          <p:nvPr>
+            <p:ph type="sldNum" sz="quarter" idx="10"/>
+          </p:nvPr>
+        </p:nvSpPr>
+        <p:spPr/>
+        <p:txBody>
+          <a:bodyPr/>
+          <a:lstStyle/>
+          <a:p>
+            <a:fld id="{0AE27A20-6DF0-4715-80D6-CAFF8BC4F1B6}" type="slidenum">
+              <a:rPr lang="en-US" smtClean="0"/>
+              <a:t>1</a:t>
+            </a:fld>
+            <a:endParaRPr lang="en-US"/>
+          </a:p>
+        </p:txBody>
+      </p:sp>
+    </p:spTree>
+    <p:extLst>
+      <p:ext uri="{BB962C8B-B14F-4D97-AF65-F5344CB8AC3E}">
+        <p14:creationId xmlns:p14="http://schemas.microsoft.com/office/powerpoint/2010/main" val="2605518528"/>
+      </p:ext>
+    </p:extLst>
+  </p:cSld>
+  <p:clrMapOvr>
+    <a:masterClrMapping/>
+  </p:clrMapOvr>
+</p:notes>
 </file>
 
 <file path=ppt/slideLayouts/slideLayout1.xml><?xml version="1.0" encoding="utf-8"?>
@@ -8576,7 +8649,7 @@
           <a:p>
             <a:fld id="{376874AF-159F-4CEC-9104-928F9FD1B2C9}" type="datetime1">
               <a:rPr lang="en-US" smtClean="0"/>
-              <a:t>2/3/2015</a:t>
+              <a:t>2/6/2015</a:t>
             </a:fld>
             <a:endParaRPr lang="en-US"/>
           </a:p>
@@ -9379,7 +9452,7 @@
           <a:p>
             <a:fld id="{31AADF11-9351-4F8A-A3F9-7FADD029A6D8}" type="datetime1">
               <a:rPr lang="en-US" smtClean="0"/>
-              <a:t>2/3/2015</a:t>
+              <a:t>2/6/2015</a:t>
             </a:fld>
             <a:endParaRPr lang="en-US"/>
           </a:p>
@@ -9559,7 +9632,7 @@
           <a:p>
             <a:fld id="{0C53FADC-7B3A-48F4-99B1-26127968BF23}" type="datetime1">
               <a:rPr lang="en-US" smtClean="0"/>
-              <a:t>2/3/2015</a:t>
+              <a:t>2/6/2015</a:t>
             </a:fld>
             <a:endParaRPr lang="en-US"/>
           </a:p>
@@ -9743,7 +9816,7 @@
           <a:p>
             <a:fld id="{4881E60F-E9AC-4322-BE61-AC93285DAEA4}" type="datetime1">
               <a:rPr lang="en-US" smtClean="0"/>
-              <a:t>2/3/2015</a:t>
+              <a:t>2/6/2015</a:t>
             </a:fld>
             <a:endParaRPr lang="en-US"/>
           </a:p>
@@ -10566,7 +10639,7 @@
           <a:p>
             <a:fld id="{F38595E2-8FF9-4742-8317-E3F9F01938B0}" type="datetime1">
               <a:rPr lang="en-US" smtClean="0"/>
-              <a:t>2/3/2015</a:t>
+              <a:t>2/6/2015</a:t>
             </a:fld>
             <a:endParaRPr lang="en-US"/>
           </a:p>
@@ -10854,7 +10927,7 @@
           <a:p>
             <a:fld id="{99AFA6CA-EC1C-40D2-8BD0-45C7B1F3AD9B}" type="datetime1">
               <a:rPr lang="en-US" smtClean="0"/>
-              <a:t>2/3/2015</a:t>
+              <a:t>2/6/2015</a:t>
             </a:fld>
             <a:endParaRPr lang="en-US"/>
           </a:p>
@@ -11276,7 +11349,7 @@
           <a:p>
             <a:fld id="{B956E2BD-C9EB-4C76-8811-39DF168BCDA1}" type="datetime1">
               <a:rPr lang="en-US" smtClean="0"/>
-              <a:t>2/3/2015</a:t>
+              <a:t>2/6/2015</a:t>
             </a:fld>
             <a:endParaRPr lang="en-US"/>
           </a:p>
@@ -11394,7 +11467,7 @@
           <a:p>
             <a:fld id="{D8ABADA8-C847-4688-A1C2-4391DA5D5716}" type="datetime1">
               <a:rPr lang="en-US" smtClean="0"/>
-              <a:t>2/3/2015</a:t>
+              <a:t>2/6/2015</a:t>
             </a:fld>
             <a:endParaRPr lang="en-US"/>
           </a:p>
@@ -11489,7 +11562,7 @@
           <a:p>
             <a:fld id="{DAC1E19D-366B-4BC1-98C6-648060562CFC}" type="datetime1">
               <a:rPr lang="en-US" smtClean="0"/>
-              <a:t>2/3/2015</a:t>
+              <a:t>2/6/2015</a:t>
             </a:fld>
             <a:endParaRPr lang="en-US"/>
           </a:p>
@@ -11766,7 +11839,7 @@
           <a:p>
             <a:fld id="{439D7FBD-36F1-44BC-BC3A-6EC3DE10F642}" type="datetime1">
               <a:rPr lang="en-US" smtClean="0"/>
-              <a:t>2/3/2015</a:t>
+              <a:t>2/6/2015</a:t>
             </a:fld>
             <a:endParaRPr lang="en-US"/>
           </a:p>
@@ -12019,7 +12092,7 @@
           <a:p>
             <a:fld id="{FD07A776-1210-4F33-868F-121AC297E95A}" type="datetime1">
               <a:rPr lang="en-US" smtClean="0"/>
-              <a:t>2/3/2015</a:t>
+              <a:t>2/6/2015</a:t>
             </a:fld>
             <a:endParaRPr lang="en-US"/>
           </a:p>
@@ -12232,7 +12305,7 @@
           <a:p>
             <a:fld id="{D048E1EF-96E8-486D-B984-DD8D76E8775D}" type="datetime1">
               <a:rPr lang="en-US" smtClean="0"/>
-              <a:t>2/3/2015</a:t>
+              <a:t>2/6/2015</a:t>
             </a:fld>
             <a:endParaRPr lang="en-US"/>
           </a:p>
@@ -12668,138 +12741,6 @@
       </p:sp>
       <p:sp>
         <p:nvSpPr>
-          <p:cNvPr id="3" name="Subtitle 2"/>
-          <p:cNvSpPr>
-            <a:spLocks noGrp="1"/>
-          </p:cNvSpPr>
-          <p:nvPr>
-            <p:ph type="subTitle" idx="1"/>
-          </p:nvPr>
-        </p:nvSpPr>
-        <p:spPr>
-          <a:xfrm>
-            <a:off x="395536" y="548680"/>
-            <a:ext cx="3024336" cy="1080120"/>
-          </a:xfrm>
-        </p:spPr>
-        <p:txBody>
-          <a:bodyPr>
-            <a:noAutofit/>
-          </a:bodyPr>
-          <a:lstStyle/>
-          <a:p>
-            <a:pPr algn="r">
-              <a:lnSpc>
-                <a:spcPct val="110000"/>
-              </a:lnSpc>
-              <a:spcBef>
-                <a:spcPts val="0"/>
-              </a:spcBef>
-            </a:pPr>
-            <a:r>
-              <a:rPr lang="de-DE" sz="1600" b="1" dirty="0" smtClean="0">
-                <a:solidFill>
-                  <a:schemeClr val="bg1"/>
-                </a:solidFill>
-              </a:rPr>
-              <a:t>Marco Dung</a:t>
-            </a:r>
-          </a:p>
-          <a:p>
-            <a:pPr algn="r">
-              <a:lnSpc>
-                <a:spcPct val="110000"/>
-              </a:lnSpc>
-              <a:spcBef>
-                <a:spcPts val="0"/>
-              </a:spcBef>
-            </a:pPr>
-            <a:r>
-              <a:rPr lang="de-DE" sz="1600" b="1" dirty="0" smtClean="0">
-                <a:solidFill>
-                  <a:schemeClr val="bg1"/>
-                </a:solidFill>
-              </a:rPr>
-              <a:t>Christoph Krämer</a:t>
-            </a:r>
-          </a:p>
-          <a:p>
-            <a:pPr algn="r">
-              <a:lnSpc>
-                <a:spcPct val="110000"/>
-              </a:lnSpc>
-              <a:spcBef>
-                <a:spcPts val="0"/>
-              </a:spcBef>
-            </a:pPr>
-            <a:r>
-              <a:rPr lang="de-DE" sz="1600" b="1" dirty="0" smtClean="0">
-                <a:solidFill>
-                  <a:schemeClr val="bg1"/>
-                </a:solidFill>
-              </a:rPr>
-              <a:t>Ying Li</a:t>
-            </a:r>
-          </a:p>
-          <a:p>
-            <a:pPr algn="r">
-              <a:lnSpc>
-                <a:spcPct val="110000"/>
-              </a:lnSpc>
-              <a:spcBef>
-                <a:spcPts val="0"/>
-              </a:spcBef>
-            </a:pPr>
-            <a:r>
-              <a:rPr lang="de-DE" sz="1600" b="1" dirty="0" smtClean="0">
-                <a:solidFill>
-                  <a:schemeClr val="bg1"/>
-                </a:solidFill>
-              </a:rPr>
-              <a:t> </a:t>
-            </a:r>
-          </a:p>
-          <a:p>
-            <a:pPr algn="r">
-              <a:lnSpc>
-                <a:spcPct val="110000"/>
-              </a:lnSpc>
-              <a:spcBef>
-                <a:spcPts val="0"/>
-              </a:spcBef>
-            </a:pPr>
-            <a:r>
-              <a:rPr lang="de-DE" sz="1600" b="1" dirty="0" smtClean="0">
-                <a:solidFill>
-                  <a:schemeClr val="bg1"/>
-                </a:solidFill>
-              </a:rPr>
-              <a:t>06.02.2015</a:t>
-            </a:r>
-            <a:endParaRPr lang="en-US" sz="1600" b="1" dirty="0" smtClean="0">
-              <a:solidFill>
-                <a:schemeClr val="bg1"/>
-              </a:solidFill>
-            </a:endParaRPr>
-          </a:p>
-          <a:p>
-            <a:endParaRPr lang="de-DE" sz="1600" b="1" dirty="0" smtClean="0">
-              <a:solidFill>
-                <a:schemeClr val="bg1"/>
-              </a:solidFill>
-            </a:endParaRPr>
-          </a:p>
-          <a:p>
-            <a:endParaRPr lang="en-US" sz="1600" b="1" dirty="0">
-              <a:solidFill>
-                <a:schemeClr val="bg1"/>
-              </a:solidFill>
-            </a:endParaRPr>
-          </a:p>
-        </p:txBody>
-      </p:sp>
-      <p:sp>
-        <p:nvSpPr>
           <p:cNvPr id="18" name="Rectangle 17"/>
           <p:cNvSpPr/>
           <p:nvPr/>
@@ -12844,22 +12785,14 @@
             <a:pPr algn="r"/>
             <a:r>
               <a:rPr lang="de-DE" b="1" dirty="0" smtClean="0"/>
-              <a:t>Development Team: </a:t>
-            </a:r>
-            <a:r>
-              <a:rPr lang="de-DE" b="1" dirty="0" smtClean="0"/>
-              <a:t>Marco Dung, Christoph Krämer, Ying Li  </a:t>
+              <a:t>Development Team: Marco Dung, Christoph Krämer, Ying Li  </a:t>
             </a:r>
           </a:p>
           <a:p>
             <a:pPr algn="r"/>
             <a:r>
               <a:rPr lang="en-US" b="1" dirty="0" smtClean="0"/>
-              <a:t>06.02.2015</a:t>
-            </a:r>
-            <a:r>
-              <a:rPr lang="en-US" b="1" dirty="0" smtClean="0"/>
-              <a:t>, </a:t>
+              <a:t>06.02.2015, </a:t>
             </a:r>
             <a:r>
               <a:rPr lang="de-DE" b="1" dirty="0"/>
@@ -12882,7 +12815,7 @@
         <p:spPr>
           <a:xfrm>
             <a:off x="2483232" y="2665230"/>
-            <a:ext cx="4681056" cy="2779994"/>
+            <a:ext cx="4681056" cy="2563970"/>
           </a:xfrm>
           <a:prstGeom prst="roundRect">
             <a:avLst/>
@@ -12928,7 +12861,7 @@
         <p:spPr>
           <a:xfrm>
             <a:off x="2666008" y="2809638"/>
-            <a:ext cx="4320480" cy="2495762"/>
+            <a:ext cx="4320480" cy="2275546"/>
           </a:xfrm>
           <a:prstGeom prst="roundRect">
             <a:avLst/>
@@ -12972,14 +12905,14 @@
       </p:sp>
       <p:pic>
         <p:nvPicPr>
-          <p:cNvPr id="3074" name="Picture 2"/>
+          <p:cNvPr id="1026" name="Picture 2"/>
           <p:cNvPicPr>
             <a:picLocks noChangeAspect="1" noChangeArrowheads="1"/>
           </p:cNvPicPr>
           <p:nvPr/>
         </p:nvPicPr>
         <p:blipFill>
-          <a:blip r:embed="rId2" cstate="print">
+          <a:blip r:embed="rId3" cstate="print">
             <a:extLst>
               <a:ext uri="{28A0092B-C50C-407E-A947-70E740481C1C}">
                 <a14:useLocalDpi xmlns:a14="http://schemas.microsoft.com/office/drawing/2010/main" val="0"/>
@@ -12993,8 +12926,8 @@
         </p:blipFill>
         <p:spPr bwMode="auto">
           <a:xfrm>
-            <a:off x="3059832" y="2840118"/>
-            <a:ext cx="3600400" cy="2419562"/>
+            <a:off x="2923663" y="2901078"/>
+            <a:ext cx="3849884" cy="2059522"/>
           </a:xfrm>
           <a:prstGeom prst="rect">
             <a:avLst/>
@@ -13024,10 +12957,375 @@
           </a:extLst>
         </p:spPr>
       </p:pic>
+      <p:sp>
+        <p:nvSpPr>
+          <p:cNvPr id="5" name="Subtitle 4"/>
+          <p:cNvSpPr>
+            <a:spLocks noGrp="1"/>
+          </p:cNvSpPr>
+          <p:nvPr>
+            <p:ph type="subTitle" idx="1"/>
+          </p:nvPr>
+        </p:nvSpPr>
+        <p:spPr/>
+        <p:txBody>
+          <a:bodyPr/>
+          <a:lstStyle/>
+          <a:p>
+            <a:endParaRPr lang="en-US"/>
+          </a:p>
+        </p:txBody>
+      </p:sp>
     </p:spTree>
     <p:extLst>
       <p:ext uri="{BB962C8B-B14F-4D97-AF65-F5344CB8AC3E}">
         <p14:creationId xmlns:p14="http://schemas.microsoft.com/office/powerpoint/2010/main" val="3468920714"/>
+      </p:ext>
+    </p:extLst>
+  </p:cSld>
+  <p:clrMapOvr>
+    <a:masterClrMapping/>
+  </p:clrMapOvr>
+  <p:timing>
+    <p:tnLst>
+      <p:par>
+        <p:cTn id="1" dur="indefinite" restart="never" nodeType="tmRoot"/>
+      </p:par>
+    </p:tnLst>
+  </p:timing>
+</p:sld>
+</file>
+
+<file path=ppt/slides/slide10.xml><?xml version="1.0" encoding="utf-8"?>
+<p:sld xmlns:a="http://schemas.openxmlformats.org/drawingml/2006/main" xmlns:r="http://schemas.openxmlformats.org/officeDocument/2006/relationships" xmlns:p="http://schemas.openxmlformats.org/presentationml/2006/main">
+  <p:cSld>
+    <p:spTree>
+      <p:nvGrpSpPr>
+        <p:cNvPr id="1" name=""/>
+        <p:cNvGrpSpPr/>
+        <p:nvPr/>
+      </p:nvGrpSpPr>
+      <p:grpSpPr>
+        <a:xfrm>
+          <a:off x="0" y="0"/>
+          <a:ext cx="0" cy="0"/>
+          <a:chOff x="0" y="0"/>
+          <a:chExt cx="0" cy="0"/>
+        </a:xfrm>
+      </p:grpSpPr>
+      <p:sp>
+        <p:nvSpPr>
+          <p:cNvPr id="2" name="Title 1"/>
+          <p:cNvSpPr>
+            <a:spLocks noGrp="1"/>
+          </p:cNvSpPr>
+          <p:nvPr>
+            <p:ph type="title"/>
+          </p:nvPr>
+        </p:nvSpPr>
+        <p:spPr/>
+        <p:txBody>
+          <a:bodyPr/>
+          <a:lstStyle/>
+          <a:p>
+            <a:r>
+              <a:rPr lang="en-US" dirty="0" smtClean="0"/>
+              <a:t>Message Management</a:t>
+            </a:r>
+            <a:endParaRPr lang="en-US" dirty="0"/>
+          </a:p>
+        </p:txBody>
+      </p:sp>
+      <p:sp>
+        <p:nvSpPr>
+          <p:cNvPr id="4" name="Slide Number Placeholder 3"/>
+          <p:cNvSpPr>
+            <a:spLocks noGrp="1"/>
+          </p:cNvSpPr>
+          <p:nvPr>
+            <p:ph type="sldNum" sz="quarter" idx="12"/>
+          </p:nvPr>
+        </p:nvSpPr>
+        <p:spPr/>
+        <p:txBody>
+          <a:bodyPr/>
+          <a:lstStyle/>
+          <a:p>
+            <a:fld id="{639B228B-E4D6-40B8-B79B-9A0D26B7F84A}" type="slidenum">
+              <a:rPr lang="en-US" smtClean="0"/>
+              <a:pPr/>
+              <a:t>10</a:t>
+            </a:fld>
+            <a:endParaRPr lang="en-US" dirty="0"/>
+          </a:p>
+        </p:txBody>
+      </p:sp>
+      <p:pic>
+        <p:nvPicPr>
+          <p:cNvPr id="2050" name="Picture 2"/>
+          <p:cNvPicPr>
+            <a:picLocks noChangeAspect="1" noChangeArrowheads="1"/>
+          </p:cNvPicPr>
+          <p:nvPr/>
+        </p:nvPicPr>
+        <p:blipFill>
+          <a:blip r:embed="rId2">
+            <a:extLst>
+              <a:ext uri="{28A0092B-C50C-407E-A947-70E740481C1C}">
+                <a14:useLocalDpi xmlns:a14="http://schemas.microsoft.com/office/drawing/2010/main" val="0"/>
+              </a:ext>
+            </a:extLst>
+          </a:blip>
+          <a:srcRect/>
+          <a:stretch>
+            <a:fillRect/>
+          </a:stretch>
+        </p:blipFill>
+        <p:spPr bwMode="auto">
+          <a:xfrm>
+            <a:off x="2974032" y="1495425"/>
+            <a:ext cx="5486400" cy="4933950"/>
+          </a:xfrm>
+          <a:prstGeom prst="rect">
+            <a:avLst/>
+          </a:prstGeom>
+          <a:noFill/>
+          <a:ln>
+            <a:noFill/>
+          </a:ln>
+          <a:extLst>
+            <a:ext uri="{909E8E84-426E-40DD-AFC4-6F175D3DCCD1}">
+              <a14:hiddenFill xmlns:a14="http://schemas.microsoft.com/office/drawing/2010/main">
+                <a:solidFill>
+                  <a:schemeClr val="accent1"/>
+                </a:solidFill>
+              </a14:hiddenFill>
+            </a:ext>
+            <a:ext uri="{91240B29-F687-4F45-9708-019B960494DF}">
+              <a14:hiddenLine xmlns:a14="http://schemas.microsoft.com/office/drawing/2010/main" w="9525">
+                <a:solidFill>
+                  <a:schemeClr val="tx1"/>
+                </a:solidFill>
+                <a:miter lim="800000"/>
+                <a:headEnd/>
+                <a:tailEnd/>
+              </a14:hiddenLine>
+            </a:ext>
+          </a:extLst>
+        </p:spPr>
+      </p:pic>
+      <p:sp>
+        <p:nvSpPr>
+          <p:cNvPr id="6" name="Striped Right Arrow 5">
+            <a:hlinkClick r:id="rId3" action="ppaction://hlinksldjump"/>
+          </p:cNvPr>
+          <p:cNvSpPr/>
+          <p:nvPr/>
+        </p:nvSpPr>
+        <p:spPr>
+          <a:xfrm>
+            <a:off x="8460432" y="5949280"/>
+            <a:ext cx="288032" cy="261744"/>
+          </a:xfrm>
+          <a:prstGeom prst="stripedRightArrow">
+            <a:avLst/>
+          </a:prstGeom>
+          <a:solidFill>
+            <a:schemeClr val="bg2">
+              <a:lumMod val="50000"/>
+            </a:schemeClr>
+          </a:solidFill>
+          <a:ln>
+            <a:noFill/>
+          </a:ln>
+        </p:spPr>
+        <p:style>
+          <a:lnRef idx="2">
+            <a:schemeClr val="accent1">
+              <a:shade val="50000"/>
+            </a:schemeClr>
+          </a:lnRef>
+          <a:fillRef idx="1">
+            <a:schemeClr val="accent1"/>
+          </a:fillRef>
+          <a:effectRef idx="0">
+            <a:schemeClr val="accent1"/>
+          </a:effectRef>
+          <a:fontRef idx="minor">
+            <a:schemeClr val="lt1"/>
+          </a:fontRef>
+        </p:style>
+        <p:txBody>
+          <a:bodyPr rtlCol="0" anchor="ctr"/>
+          <a:lstStyle/>
+          <a:p>
+            <a:pPr algn="ctr"/>
+            <a:endParaRPr lang="en-US"/>
+          </a:p>
+        </p:txBody>
+      </p:sp>
+      <p:sp>
+        <p:nvSpPr>
+          <p:cNvPr id="7" name="Rounded Rectangle 6"/>
+          <p:cNvSpPr/>
+          <p:nvPr/>
+        </p:nvSpPr>
+        <p:spPr>
+          <a:xfrm>
+            <a:off x="46544" y="1486277"/>
+            <a:ext cx="2880320" cy="1584176"/>
+          </a:xfrm>
+          <a:prstGeom prst="roundRect">
+            <a:avLst/>
+          </a:prstGeom>
+          <a:pattFill prst="pct5">
+            <a:fgClr>
+              <a:srgbClr val="F9A703"/>
+            </a:fgClr>
+            <a:bgClr>
+              <a:schemeClr val="bg1"/>
+            </a:bgClr>
+          </a:pattFill>
+          <a:ln w="50800">
+            <a:solidFill>
+              <a:srgbClr val="F9A703"/>
+            </a:solidFill>
+          </a:ln>
+        </p:spPr>
+        <p:style>
+          <a:lnRef idx="2">
+            <a:schemeClr val="accent1">
+              <a:shade val="50000"/>
+            </a:schemeClr>
+          </a:lnRef>
+          <a:fillRef idx="1">
+            <a:schemeClr val="accent1"/>
+          </a:fillRef>
+          <a:effectRef idx="0">
+            <a:schemeClr val="accent1"/>
+          </a:effectRef>
+          <a:fontRef idx="minor">
+            <a:schemeClr val="lt1"/>
+          </a:fontRef>
+        </p:style>
+        <p:txBody>
+          <a:bodyPr rtlCol="0" anchor="ctr"/>
+          <a:lstStyle/>
+          <a:p>
+            <a:endParaRPr lang="en-US" b="1">
+              <a:solidFill>
+                <a:schemeClr val="accent2"/>
+              </a:solidFill>
+            </a:endParaRPr>
+          </a:p>
+        </p:txBody>
+      </p:sp>
+      <p:sp>
+        <p:nvSpPr>
+          <p:cNvPr id="8" name="TextBox 7"/>
+          <p:cNvSpPr txBox="1"/>
+          <p:nvPr/>
+        </p:nvSpPr>
+        <p:spPr>
+          <a:xfrm>
+            <a:off x="68114" y="1673721"/>
+            <a:ext cx="2827249" cy="1477328"/>
+          </a:xfrm>
+          <a:prstGeom prst="rect">
+            <a:avLst/>
+          </a:prstGeom>
+          <a:noFill/>
+        </p:spPr>
+        <p:txBody>
+          <a:bodyPr wrap="none" rtlCol="0">
+            <a:spAutoFit/>
+          </a:bodyPr>
+          <a:lstStyle/>
+          <a:p>
+            <a:r>
+              <a:rPr lang="en-US" b="1" dirty="0" smtClean="0"/>
+              <a:t>Message Management</a:t>
+            </a:r>
+          </a:p>
+          <a:p>
+            <a:pPr marL="285750" indent="-285750">
+              <a:buClr>
+                <a:srgbClr val="F9A703"/>
+              </a:buClr>
+              <a:buFont typeface="Wingdings" panose="05000000000000000000" pitchFamily="2" charset="2"/>
+              <a:buChar char="§"/>
+            </a:pPr>
+            <a:r>
+              <a:rPr lang="de-DE" dirty="0" err="1" smtClean="0"/>
+              <a:t>messages</a:t>
+            </a:r>
+            <a:r>
+              <a:rPr lang="de-DE" dirty="0" smtClean="0"/>
+              <a:t> </a:t>
+            </a:r>
+            <a:r>
+              <a:rPr lang="de-DE" dirty="0" err="1"/>
+              <a:t>to</a:t>
+            </a:r>
+            <a:r>
+              <a:rPr lang="de-DE" dirty="0"/>
+              <a:t> offline </a:t>
+            </a:r>
+            <a:r>
+              <a:rPr lang="de-DE" dirty="0" err="1"/>
+              <a:t>users</a:t>
+            </a:r>
+            <a:endParaRPr lang="de-DE" dirty="0"/>
+          </a:p>
+          <a:p>
+            <a:pPr marL="285750" indent="-285750">
+              <a:buClr>
+                <a:srgbClr val="F9A703"/>
+              </a:buClr>
+              <a:buFont typeface="Wingdings" panose="05000000000000000000" pitchFamily="2" charset="2"/>
+              <a:buChar char="§"/>
+            </a:pPr>
+            <a:r>
+              <a:rPr lang="de-DE" dirty="0" err="1"/>
+              <a:t>chat</a:t>
+            </a:r>
+            <a:r>
+              <a:rPr lang="de-DE" dirty="0"/>
+              <a:t> </a:t>
+            </a:r>
+            <a:r>
+              <a:rPr lang="de-DE" dirty="0" err="1"/>
+              <a:t>history</a:t>
+            </a:r>
+            <a:endParaRPr lang="de-DE" dirty="0"/>
+          </a:p>
+          <a:p>
+            <a:pPr marL="285750" indent="-285750">
+              <a:buClr>
+                <a:srgbClr val="F9A703"/>
+              </a:buClr>
+              <a:buFont typeface="Wingdings" panose="05000000000000000000" pitchFamily="2" charset="2"/>
+              <a:buChar char="§"/>
+            </a:pPr>
+            <a:r>
+              <a:rPr lang="de-DE" dirty="0"/>
+              <a:t>funny </a:t>
+            </a:r>
+            <a:r>
+              <a:rPr lang="de-DE" dirty="0" err="1"/>
+              <a:t>icons</a:t>
+            </a:r>
+            <a:endParaRPr lang="de-DE" dirty="0"/>
+          </a:p>
+          <a:p>
+            <a:endParaRPr lang="en-US" dirty="0"/>
+          </a:p>
+        </p:txBody>
+      </p:sp>
+    </p:spTree>
+    <p:extLst>
+      <p:ext uri="{BB962C8B-B14F-4D97-AF65-F5344CB8AC3E}">
+        <p14:creationId xmlns:p14="http://schemas.microsoft.com/office/powerpoint/2010/main" val="3685778075"/>
       </p:ext>
     </p:extLst>
   </p:cSld>
@@ -13118,7 +13416,7 @@
         </p:nvSpPr>
         <p:spPr>
           <a:xfrm>
-            <a:off x="1259632" y="1628800"/>
+            <a:off x="1259632" y="1674520"/>
             <a:ext cx="2880320" cy="1584176"/>
           </a:xfrm>
           <a:prstGeom prst="roundRect">
@@ -13174,8 +13472,8 @@
         </p:nvSpPr>
         <p:spPr>
           <a:xfrm>
-            <a:off x="4644008" y="1628800"/>
-            <a:ext cx="2880320" cy="1584176"/>
+            <a:off x="4644008" y="1674520"/>
+            <a:ext cx="2903960" cy="1584176"/>
           </a:xfrm>
           <a:prstGeom prst="roundRect">
             <a:avLst/>
@@ -13342,7 +13640,7 @@
         </p:nvSpPr>
         <p:spPr>
           <a:xfrm>
-            <a:off x="1475656" y="1628800"/>
+            <a:off x="1475656" y="1674520"/>
             <a:ext cx="2144113" cy="1477328"/>
           </a:xfrm>
           <a:prstGeom prst="rect">
@@ -13423,7 +13721,7 @@
         </p:nvSpPr>
         <p:spPr>
           <a:xfrm>
-            <a:off x="5056726" y="1628800"/>
+            <a:off x="5056726" y="1674520"/>
             <a:ext cx="2413931" cy="1477328"/>
           </a:xfrm>
           <a:prstGeom prst="rect">
@@ -13529,7 +13827,7 @@
         </p:nvSpPr>
         <p:spPr>
           <a:xfrm>
-            <a:off x="1331640" y="4365104"/>
+            <a:off x="1331640" y="4319384"/>
             <a:ext cx="2757422" cy="1754326"/>
           </a:xfrm>
           <a:prstGeom prst="rect">
@@ -13642,7 +13940,7 @@
         </p:nvSpPr>
         <p:spPr>
           <a:xfrm>
-            <a:off x="4735761" y="4360912"/>
+            <a:off x="4735761" y="4323576"/>
             <a:ext cx="2827249" cy="1477328"/>
           </a:xfrm>
           <a:prstGeom prst="rect">
@@ -13822,6 +14120,206 @@
                 <a:schemeClr val="bg1"/>
               </a:solidFill>
             </a:endParaRPr>
+          </a:p>
+        </p:txBody>
+      </p:sp>
+      <p:sp>
+        <p:nvSpPr>
+          <p:cNvPr id="3" name="Striped Right Arrow 2">
+            <a:hlinkClick r:id="rId2" action="ppaction://hlinksldjump"/>
+          </p:cNvPr>
+          <p:cNvSpPr/>
+          <p:nvPr/>
+        </p:nvSpPr>
+        <p:spPr>
+          <a:xfrm>
+            <a:off x="1475656" y="2905512"/>
+            <a:ext cx="288032" cy="261744"/>
+          </a:xfrm>
+          <a:prstGeom prst="stripedRightArrow">
+            <a:avLst/>
+          </a:prstGeom>
+          <a:solidFill>
+            <a:schemeClr val="bg2">
+              <a:lumMod val="50000"/>
+            </a:schemeClr>
+          </a:solidFill>
+          <a:ln>
+            <a:noFill/>
+          </a:ln>
+        </p:spPr>
+        <p:style>
+          <a:lnRef idx="2">
+            <a:schemeClr val="accent1">
+              <a:shade val="50000"/>
+            </a:schemeClr>
+          </a:lnRef>
+          <a:fillRef idx="1">
+            <a:schemeClr val="accent1"/>
+          </a:fillRef>
+          <a:effectRef idx="0">
+            <a:schemeClr val="accent1"/>
+          </a:effectRef>
+          <a:fontRef idx="minor">
+            <a:schemeClr val="lt1"/>
+          </a:fontRef>
+        </p:style>
+        <p:txBody>
+          <a:bodyPr rtlCol="0" anchor="ctr"/>
+          <a:lstStyle/>
+          <a:p>
+            <a:pPr algn="ctr"/>
+            <a:endParaRPr lang="en-US"/>
+          </a:p>
+        </p:txBody>
+      </p:sp>
+      <p:sp>
+        <p:nvSpPr>
+          <p:cNvPr id="14" name="Striped Right Arrow 13">
+            <a:hlinkClick r:id="rId3" action="ppaction://hlinksldjump"/>
+          </p:cNvPr>
+          <p:cNvSpPr/>
+          <p:nvPr/>
+        </p:nvSpPr>
+        <p:spPr>
+          <a:xfrm>
+            <a:off x="7020272" y="2878656"/>
+            <a:ext cx="288032" cy="261744"/>
+          </a:xfrm>
+          <a:prstGeom prst="stripedRightArrow">
+            <a:avLst/>
+          </a:prstGeom>
+          <a:solidFill>
+            <a:schemeClr val="bg2">
+              <a:lumMod val="50000"/>
+            </a:schemeClr>
+          </a:solidFill>
+          <a:ln>
+            <a:noFill/>
+          </a:ln>
+        </p:spPr>
+        <p:style>
+          <a:lnRef idx="2">
+            <a:schemeClr val="accent1">
+              <a:shade val="50000"/>
+            </a:schemeClr>
+          </a:lnRef>
+          <a:fillRef idx="1">
+            <a:schemeClr val="accent1"/>
+          </a:fillRef>
+          <a:effectRef idx="0">
+            <a:schemeClr val="accent1"/>
+          </a:effectRef>
+          <a:fontRef idx="minor">
+            <a:schemeClr val="lt1"/>
+          </a:fontRef>
+        </p:style>
+        <p:txBody>
+          <a:bodyPr rtlCol="0" anchor="ctr"/>
+          <a:lstStyle/>
+          <a:p>
+            <a:pPr algn="ctr"/>
+            <a:endParaRPr lang="en-US"/>
+          </a:p>
+        </p:txBody>
+      </p:sp>
+      <p:sp>
+        <p:nvSpPr>
+          <p:cNvPr id="15" name="Striped Right Arrow 14">
+            <a:hlinkClick r:id="rId4" action="ppaction://hlinksldjump"/>
+          </p:cNvPr>
+          <p:cNvSpPr/>
+          <p:nvPr/>
+        </p:nvSpPr>
+        <p:spPr>
+          <a:xfrm>
+            <a:off x="1475656" y="5470160"/>
+            <a:ext cx="288032" cy="261744"/>
+          </a:xfrm>
+          <a:prstGeom prst="stripedRightArrow">
+            <a:avLst/>
+          </a:prstGeom>
+          <a:solidFill>
+            <a:schemeClr val="bg2">
+              <a:lumMod val="50000"/>
+            </a:schemeClr>
+          </a:solidFill>
+          <a:ln>
+            <a:noFill/>
+          </a:ln>
+        </p:spPr>
+        <p:style>
+          <a:lnRef idx="2">
+            <a:schemeClr val="accent1">
+              <a:shade val="50000"/>
+            </a:schemeClr>
+          </a:lnRef>
+          <a:fillRef idx="1">
+            <a:schemeClr val="accent1"/>
+          </a:fillRef>
+          <a:effectRef idx="0">
+            <a:schemeClr val="accent1"/>
+          </a:effectRef>
+          <a:fontRef idx="minor">
+            <a:schemeClr val="lt1"/>
+          </a:fontRef>
+        </p:style>
+        <p:txBody>
+          <a:bodyPr rtlCol="0" anchor="ctr"/>
+          <a:lstStyle/>
+          <a:p>
+            <a:pPr algn="ctr"/>
+            <a:endParaRPr lang="en-US"/>
+          </a:p>
+        </p:txBody>
+      </p:sp>
+      <p:sp>
+        <p:nvSpPr>
+          <p:cNvPr id="16" name="Striped Right Arrow 15">
+            <a:hlinkClick r:id="rId5" action="ppaction://hlinksldjump"/>
+          </p:cNvPr>
+          <p:cNvSpPr/>
+          <p:nvPr/>
+        </p:nvSpPr>
+        <p:spPr>
+          <a:xfrm>
+            <a:off x="7092280" y="5458564"/>
+            <a:ext cx="288032" cy="261744"/>
+          </a:xfrm>
+          <a:prstGeom prst="stripedRightArrow">
+            <a:avLst/>
+          </a:prstGeom>
+          <a:solidFill>
+            <a:schemeClr val="bg2">
+              <a:lumMod val="50000"/>
+            </a:schemeClr>
+          </a:solidFill>
+          <a:ln>
+            <a:noFill/>
+          </a:ln>
+        </p:spPr>
+        <p:style>
+          <a:lnRef idx="2">
+            <a:schemeClr val="accent1">
+              <a:shade val="50000"/>
+            </a:schemeClr>
+          </a:lnRef>
+          <a:fillRef idx="1">
+            <a:schemeClr val="accent1"/>
+          </a:fillRef>
+          <a:effectRef idx="0">
+            <a:schemeClr val="accent1"/>
+          </a:effectRef>
+          <a:fontRef idx="minor">
+            <a:schemeClr val="lt1"/>
+          </a:fontRef>
+        </p:style>
+        <p:txBody>
+          <a:bodyPr rtlCol="0" anchor="ctr"/>
+          <a:lstStyle/>
+          <a:p>
+            <a:pPr algn="ctr"/>
+            <a:endParaRPr lang="en-US"/>
           </a:p>
         </p:txBody>
       </p:sp>
@@ -13881,11 +14379,7 @@
           <a:p>
             <a:r>
               <a:rPr lang="en-US" dirty="0" smtClean="0"/>
-              <a:t>Target </a:t>
-            </a:r>
-            <a:r>
-              <a:rPr lang="en-US" dirty="0" smtClean="0"/>
-              <a:t>Groups</a:t>
+              <a:t>Target Groups</a:t>
             </a:r>
             <a:endParaRPr lang="en-US" dirty="0"/>
           </a:p>
@@ -14562,11 +15056,7 @@
               </a:pPr>
               <a:r>
                 <a:rPr lang="en-US" sz="1900" kern="1200" dirty="0" smtClean="0"/>
-                <a:t>who like working with Restful </a:t>
-              </a:r>
-              <a:r>
-                <a:rPr lang="en-US" sz="1900" kern="1200" dirty="0" smtClean="0"/>
-                <a:t>APIs</a:t>
+                <a:t>who like working with Restful APIs</a:t>
               </a:r>
               <a:endParaRPr lang="en-US" sz="1900" kern="1200" dirty="0"/>
             </a:p>
@@ -14585,11 +15075,7 @@
               </a:pPr>
               <a:r>
                 <a:rPr lang="en-US" sz="1900" kern="1200" dirty="0" smtClean="0"/>
-                <a:t>who are fans of </a:t>
-              </a:r>
-              <a:r>
-                <a:rPr lang="en-US" sz="1900" kern="1200" dirty="0" smtClean="0"/>
-                <a:t>open source software </a:t>
+                <a:t>who are fans of open source software </a:t>
               </a:r>
               <a:endParaRPr lang="en-US" sz="1900" kern="1200" dirty="0"/>
             </a:p>
@@ -14795,7 +15281,7 @@
           <p:nvPr>
             <p:extLst>
               <p:ext uri="{D42A27DB-BD31-4B8C-83A1-F6EECF244321}">
-                <p14:modId xmlns:p14="http://schemas.microsoft.com/office/powerpoint/2010/main" val="830465199"/>
+                <p14:modId xmlns:p14="http://schemas.microsoft.com/office/powerpoint/2010/main" val="1782650373"/>
               </p:ext>
             </p:extLst>
           </p:nvPr>
@@ -15416,6 +15902,1560 @@
     <p:extLst>
       <p:ext uri="{BB962C8B-B14F-4D97-AF65-F5344CB8AC3E}">
         <p14:creationId xmlns:p14="http://schemas.microsoft.com/office/powerpoint/2010/main" val="521654784"/>
+      </p:ext>
+    </p:extLst>
+  </p:cSld>
+  <p:clrMapOvr>
+    <a:masterClrMapping/>
+  </p:clrMapOvr>
+  <p:timing>
+    <p:tnLst>
+      <p:par>
+        <p:cTn id="1" dur="indefinite" restart="never" nodeType="tmRoot"/>
+      </p:par>
+    </p:tnLst>
+  </p:timing>
+</p:sld>
+</file>
+
+<file path=ppt/slides/slide6.xml><?xml version="1.0" encoding="utf-8"?>
+<p:sld xmlns:a="http://schemas.openxmlformats.org/drawingml/2006/main" xmlns:r="http://schemas.openxmlformats.org/officeDocument/2006/relationships" xmlns:p="http://schemas.openxmlformats.org/presentationml/2006/main">
+  <p:cSld>
+    <p:spTree>
+      <p:nvGrpSpPr>
+        <p:cNvPr id="1" name=""/>
+        <p:cNvGrpSpPr/>
+        <p:nvPr/>
+      </p:nvGrpSpPr>
+      <p:grpSpPr>
+        <a:xfrm>
+          <a:off x="0" y="0"/>
+          <a:ext cx="0" cy="0"/>
+          <a:chOff x="0" y="0"/>
+          <a:chExt cx="0" cy="0"/>
+        </a:xfrm>
+      </p:grpSpPr>
+      <p:sp>
+        <p:nvSpPr>
+          <p:cNvPr id="2" name="Title 1"/>
+          <p:cNvSpPr>
+            <a:spLocks noGrp="1"/>
+          </p:cNvSpPr>
+          <p:nvPr>
+            <p:ph type="title"/>
+          </p:nvPr>
+        </p:nvSpPr>
+        <p:spPr/>
+        <p:txBody>
+          <a:bodyPr/>
+          <a:lstStyle/>
+          <a:p>
+            <a:endParaRPr lang="en-US"/>
+          </a:p>
+        </p:txBody>
+      </p:sp>
+      <p:sp>
+        <p:nvSpPr>
+          <p:cNvPr id="3" name="Content Placeholder 2"/>
+          <p:cNvSpPr>
+            <a:spLocks noGrp="1"/>
+          </p:cNvSpPr>
+          <p:nvPr>
+            <p:ph idx="1"/>
+          </p:nvPr>
+        </p:nvSpPr>
+        <p:spPr>
+          <a:xfrm>
+            <a:off x="457200" y="2924945"/>
+            <a:ext cx="8229600" cy="1656184"/>
+          </a:xfrm>
+        </p:spPr>
+        <p:txBody>
+          <a:bodyPr>
+            <a:normAutofit/>
+          </a:bodyPr>
+          <a:lstStyle/>
+          <a:p>
+            <a:pPr marL="0" indent="0" algn="ctr">
+              <a:buNone/>
+            </a:pPr>
+            <a:r>
+              <a:rPr lang="en-US" sz="4000" dirty="0" smtClean="0">
+                <a:latin typeface="Forte" panose="03060902040502070203" pitchFamily="66" charset="0"/>
+              </a:rPr>
+              <a:t>Thank you for your attention!</a:t>
+            </a:r>
+            <a:endParaRPr lang="en-US" sz="4000" dirty="0">
+              <a:latin typeface="Forte" panose="03060902040502070203" pitchFamily="66" charset="0"/>
+            </a:endParaRPr>
+          </a:p>
+        </p:txBody>
+      </p:sp>
+      <p:sp>
+        <p:nvSpPr>
+          <p:cNvPr id="4" name="Slide Number Placeholder 3"/>
+          <p:cNvSpPr>
+            <a:spLocks noGrp="1"/>
+          </p:cNvSpPr>
+          <p:nvPr>
+            <p:ph type="sldNum" sz="quarter" idx="12"/>
+          </p:nvPr>
+        </p:nvSpPr>
+        <p:spPr/>
+        <p:txBody>
+          <a:bodyPr/>
+          <a:lstStyle/>
+          <a:p>
+            <a:fld id="{639B228B-E4D6-40B8-B79B-9A0D26B7F84A}" type="slidenum">
+              <a:rPr lang="en-US" smtClean="0"/>
+              <a:pPr/>
+              <a:t>6</a:t>
+            </a:fld>
+            <a:endParaRPr lang="en-US" dirty="0"/>
+          </a:p>
+        </p:txBody>
+      </p:sp>
+    </p:spTree>
+    <p:extLst>
+      <p:ext uri="{BB962C8B-B14F-4D97-AF65-F5344CB8AC3E}">
+        <p14:creationId xmlns:p14="http://schemas.microsoft.com/office/powerpoint/2010/main" val="1147151401"/>
+      </p:ext>
+    </p:extLst>
+  </p:cSld>
+  <p:clrMapOvr>
+    <a:masterClrMapping/>
+  </p:clrMapOvr>
+  <p:timing>
+    <p:tnLst>
+      <p:par>
+        <p:cTn id="1" dur="indefinite" restart="never" nodeType="tmRoot"/>
+      </p:par>
+    </p:tnLst>
+  </p:timing>
+</p:sld>
+</file>
+
+<file path=ppt/slides/slide7.xml><?xml version="1.0" encoding="utf-8"?>
+<p:sld xmlns:a="http://schemas.openxmlformats.org/drawingml/2006/main" xmlns:r="http://schemas.openxmlformats.org/officeDocument/2006/relationships" xmlns:p="http://schemas.openxmlformats.org/presentationml/2006/main">
+  <p:cSld>
+    <p:spTree>
+      <p:nvGrpSpPr>
+        <p:cNvPr id="1" name=""/>
+        <p:cNvGrpSpPr/>
+        <p:nvPr/>
+      </p:nvGrpSpPr>
+      <p:grpSpPr>
+        <a:xfrm>
+          <a:off x="0" y="0"/>
+          <a:ext cx="0" cy="0"/>
+          <a:chOff x="0" y="0"/>
+          <a:chExt cx="0" cy="0"/>
+        </a:xfrm>
+      </p:grpSpPr>
+      <p:sp>
+        <p:nvSpPr>
+          <p:cNvPr id="2" name="Title 1"/>
+          <p:cNvSpPr>
+            <a:spLocks noGrp="1"/>
+          </p:cNvSpPr>
+          <p:nvPr>
+            <p:ph type="title"/>
+          </p:nvPr>
+        </p:nvSpPr>
+        <p:spPr/>
+        <p:txBody>
+          <a:bodyPr/>
+          <a:lstStyle/>
+          <a:p>
+            <a:r>
+              <a:rPr lang="en-US" dirty="0" smtClean="0"/>
+              <a:t>Profile Management</a:t>
+            </a:r>
+            <a:endParaRPr lang="en-US" dirty="0"/>
+          </a:p>
+        </p:txBody>
+      </p:sp>
+      <p:sp>
+        <p:nvSpPr>
+          <p:cNvPr id="4" name="Slide Number Placeholder 3"/>
+          <p:cNvSpPr>
+            <a:spLocks noGrp="1"/>
+          </p:cNvSpPr>
+          <p:nvPr>
+            <p:ph type="sldNum" sz="quarter" idx="12"/>
+          </p:nvPr>
+        </p:nvSpPr>
+        <p:spPr/>
+        <p:txBody>
+          <a:bodyPr/>
+          <a:lstStyle/>
+          <a:p>
+            <a:fld id="{639B228B-E4D6-40B8-B79B-9A0D26B7F84A}" type="slidenum">
+              <a:rPr lang="en-US" smtClean="0"/>
+              <a:pPr/>
+              <a:t>7</a:t>
+            </a:fld>
+            <a:endParaRPr lang="en-US" dirty="0"/>
+          </a:p>
+        </p:txBody>
+      </p:sp>
+      <p:pic>
+        <p:nvPicPr>
+          <p:cNvPr id="5" name="Picture 3"/>
+          <p:cNvPicPr>
+            <a:picLocks noChangeAspect="1" noChangeArrowheads="1"/>
+          </p:cNvPicPr>
+          <p:nvPr/>
+        </p:nvPicPr>
+        <p:blipFill>
+          <a:blip r:embed="rId2">
+            <a:extLst>
+              <a:ext uri="{28A0092B-C50C-407E-A947-70E740481C1C}">
+                <a14:useLocalDpi xmlns:a14="http://schemas.microsoft.com/office/drawing/2010/main" val="0"/>
+              </a:ext>
+            </a:extLst>
+          </a:blip>
+          <a:srcRect/>
+          <a:stretch>
+            <a:fillRect/>
+          </a:stretch>
+        </p:blipFill>
+        <p:spPr bwMode="auto">
+          <a:xfrm>
+            <a:off x="3419872" y="1702425"/>
+            <a:ext cx="4127351" cy="4498349"/>
+          </a:xfrm>
+          <a:prstGeom prst="rect">
+            <a:avLst/>
+          </a:prstGeom>
+          <a:noFill/>
+          <a:ln>
+            <a:noFill/>
+          </a:ln>
+          <a:extLst>
+            <a:ext uri="{909E8E84-426E-40DD-AFC4-6F175D3DCCD1}">
+              <a14:hiddenFill xmlns:a14="http://schemas.microsoft.com/office/drawing/2010/main">
+                <a:solidFill>
+                  <a:schemeClr val="accent1"/>
+                </a:solidFill>
+              </a14:hiddenFill>
+            </a:ext>
+            <a:ext uri="{91240B29-F687-4F45-9708-019B960494DF}">
+              <a14:hiddenLine xmlns:a14="http://schemas.microsoft.com/office/drawing/2010/main" w="9525">
+                <a:solidFill>
+                  <a:schemeClr val="tx1"/>
+                </a:solidFill>
+                <a:miter lim="800000"/>
+                <a:headEnd/>
+                <a:tailEnd/>
+              </a14:hiddenLine>
+            </a:ext>
+          </a:extLst>
+        </p:spPr>
+      </p:pic>
+      <p:sp>
+        <p:nvSpPr>
+          <p:cNvPr id="7" name="Striped Right Arrow 6">
+            <a:hlinkClick r:id="rId3" action="ppaction://hlinksldjump"/>
+          </p:cNvPr>
+          <p:cNvSpPr/>
+          <p:nvPr/>
+        </p:nvSpPr>
+        <p:spPr>
+          <a:xfrm>
+            <a:off x="8460432" y="5949280"/>
+            <a:ext cx="288032" cy="261744"/>
+          </a:xfrm>
+          <a:prstGeom prst="stripedRightArrow">
+            <a:avLst/>
+          </a:prstGeom>
+          <a:solidFill>
+            <a:schemeClr val="bg2">
+              <a:lumMod val="50000"/>
+            </a:schemeClr>
+          </a:solidFill>
+          <a:ln>
+            <a:noFill/>
+          </a:ln>
+        </p:spPr>
+        <p:style>
+          <a:lnRef idx="2">
+            <a:schemeClr val="accent1">
+              <a:shade val="50000"/>
+            </a:schemeClr>
+          </a:lnRef>
+          <a:fillRef idx="1">
+            <a:schemeClr val="accent1"/>
+          </a:fillRef>
+          <a:effectRef idx="0">
+            <a:schemeClr val="accent1"/>
+          </a:effectRef>
+          <a:fontRef idx="minor">
+            <a:schemeClr val="lt1"/>
+          </a:fontRef>
+        </p:style>
+        <p:txBody>
+          <a:bodyPr rtlCol="0" anchor="ctr"/>
+          <a:lstStyle/>
+          <a:p>
+            <a:pPr algn="ctr"/>
+            <a:endParaRPr lang="en-US"/>
+          </a:p>
+        </p:txBody>
+      </p:sp>
+      <p:sp>
+        <p:nvSpPr>
+          <p:cNvPr id="10" name="Rounded Rectangle 9"/>
+          <p:cNvSpPr/>
+          <p:nvPr/>
+        </p:nvSpPr>
+        <p:spPr>
+          <a:xfrm>
+            <a:off x="323528" y="1670065"/>
+            <a:ext cx="2880320" cy="1584176"/>
+          </a:xfrm>
+          <a:prstGeom prst="roundRect">
+            <a:avLst/>
+          </a:prstGeom>
+          <a:pattFill prst="pct5">
+            <a:fgClr>
+              <a:srgbClr val="F9A703"/>
+            </a:fgClr>
+            <a:bgClr>
+              <a:schemeClr val="bg1"/>
+            </a:bgClr>
+          </a:pattFill>
+          <a:ln w="50800">
+            <a:solidFill>
+              <a:srgbClr val="F9A703"/>
+            </a:solidFill>
+          </a:ln>
+        </p:spPr>
+        <p:style>
+          <a:lnRef idx="2">
+            <a:schemeClr val="accent1">
+              <a:shade val="50000"/>
+            </a:schemeClr>
+          </a:lnRef>
+          <a:fillRef idx="1">
+            <a:schemeClr val="accent1"/>
+          </a:fillRef>
+          <a:effectRef idx="0">
+            <a:schemeClr val="accent1"/>
+          </a:effectRef>
+          <a:fontRef idx="minor">
+            <a:schemeClr val="lt1"/>
+          </a:fontRef>
+        </p:style>
+        <p:txBody>
+          <a:bodyPr rtlCol="0" anchor="ctr"/>
+          <a:lstStyle/>
+          <a:p>
+            <a:endParaRPr lang="en-US" b="1" dirty="0">
+              <a:solidFill>
+                <a:schemeClr val="accent2"/>
+              </a:solidFill>
+            </a:endParaRPr>
+          </a:p>
+        </p:txBody>
+      </p:sp>
+      <p:sp>
+        <p:nvSpPr>
+          <p:cNvPr id="9" name="Rectangle 8"/>
+          <p:cNvSpPr/>
+          <p:nvPr/>
+        </p:nvSpPr>
+        <p:spPr>
+          <a:xfrm>
+            <a:off x="692696" y="1861988"/>
+            <a:ext cx="2141984" cy="1200329"/>
+          </a:xfrm>
+          <a:prstGeom prst="rect">
+            <a:avLst/>
+          </a:prstGeom>
+        </p:spPr>
+        <p:txBody>
+          <a:bodyPr wrap="square">
+            <a:spAutoFit/>
+          </a:bodyPr>
+          <a:lstStyle/>
+          <a:p>
+            <a:r>
+              <a:rPr lang="en-US" b="1" dirty="0"/>
+              <a:t>Profile Management</a:t>
+            </a:r>
+          </a:p>
+          <a:p>
+            <a:pPr marL="285750" indent="-285750">
+              <a:buClr>
+                <a:srgbClr val="F9A703"/>
+              </a:buClr>
+              <a:buFont typeface="Wingdings" panose="05000000000000000000" pitchFamily="2" charset="2"/>
+              <a:buChar char="§"/>
+            </a:pPr>
+            <a:r>
+              <a:rPr lang="de-DE" dirty="0"/>
+              <a:t>update </a:t>
+            </a:r>
+            <a:r>
+              <a:rPr lang="de-DE" dirty="0" err="1"/>
+              <a:t>profile</a:t>
+            </a:r>
+            <a:endParaRPr lang="de-DE" dirty="0"/>
+          </a:p>
+          <a:p>
+            <a:pPr marL="285750" indent="-285750">
+              <a:buClr>
+                <a:srgbClr val="F9A703"/>
+              </a:buClr>
+              <a:buFont typeface="Wingdings" panose="05000000000000000000" pitchFamily="2" charset="2"/>
+              <a:buChar char="§"/>
+            </a:pPr>
+            <a:r>
+              <a:rPr lang="de-DE" dirty="0" err="1"/>
+              <a:t>picture</a:t>
+            </a:r>
+            <a:r>
+              <a:rPr lang="de-DE" dirty="0"/>
+              <a:t> link</a:t>
+            </a:r>
+          </a:p>
+          <a:p>
+            <a:pPr marL="285750" indent="-285750">
+              <a:buClr>
+                <a:srgbClr val="F9A703"/>
+              </a:buClr>
+              <a:buFont typeface="Wingdings" panose="05000000000000000000" pitchFamily="2" charset="2"/>
+              <a:buChar char="§"/>
+            </a:pPr>
+            <a:r>
+              <a:rPr lang="de-DE" dirty="0" err="1"/>
+              <a:t>visibility</a:t>
+            </a:r>
+            <a:endParaRPr lang="de-DE" dirty="0"/>
+          </a:p>
+        </p:txBody>
+      </p:sp>
+    </p:spTree>
+    <p:extLst>
+      <p:ext uri="{BB962C8B-B14F-4D97-AF65-F5344CB8AC3E}">
+        <p14:creationId xmlns:p14="http://schemas.microsoft.com/office/powerpoint/2010/main" val="3780126931"/>
+      </p:ext>
+    </p:extLst>
+  </p:cSld>
+  <p:clrMapOvr>
+    <a:masterClrMapping/>
+  </p:clrMapOvr>
+  <p:timing>
+    <p:tnLst>
+      <p:par>
+        <p:cTn id="1" dur="indefinite" restart="never" nodeType="tmRoot"/>
+      </p:par>
+    </p:tnLst>
+  </p:timing>
+</p:sld>
+</file>
+
+<file path=ppt/slides/slide8.xml><?xml version="1.0" encoding="utf-8"?>
+<p:sld xmlns:a="http://schemas.openxmlformats.org/drawingml/2006/main" xmlns:r="http://schemas.openxmlformats.org/officeDocument/2006/relationships" xmlns:p="http://schemas.openxmlformats.org/presentationml/2006/main">
+  <p:cSld>
+    <p:spTree>
+      <p:nvGrpSpPr>
+        <p:cNvPr id="1" name=""/>
+        <p:cNvGrpSpPr/>
+        <p:nvPr/>
+      </p:nvGrpSpPr>
+      <p:grpSpPr>
+        <a:xfrm>
+          <a:off x="0" y="0"/>
+          <a:ext cx="0" cy="0"/>
+          <a:chOff x="0" y="0"/>
+          <a:chExt cx="0" cy="0"/>
+        </a:xfrm>
+      </p:grpSpPr>
+      <p:sp>
+        <p:nvSpPr>
+          <p:cNvPr id="2" name="Title 1"/>
+          <p:cNvSpPr>
+            <a:spLocks noGrp="1"/>
+          </p:cNvSpPr>
+          <p:nvPr>
+            <p:ph type="title"/>
+          </p:nvPr>
+        </p:nvSpPr>
+        <p:spPr/>
+        <p:txBody>
+          <a:bodyPr/>
+          <a:lstStyle/>
+          <a:p>
+            <a:r>
+              <a:rPr lang="en-US" dirty="0" smtClean="0"/>
+              <a:t>Request Management</a:t>
+            </a:r>
+            <a:endParaRPr lang="en-US" dirty="0"/>
+          </a:p>
+        </p:txBody>
+      </p:sp>
+      <p:sp>
+        <p:nvSpPr>
+          <p:cNvPr id="4" name="Slide Number Placeholder 3"/>
+          <p:cNvSpPr>
+            <a:spLocks noGrp="1"/>
+          </p:cNvSpPr>
+          <p:nvPr>
+            <p:ph type="sldNum" sz="quarter" idx="12"/>
+          </p:nvPr>
+        </p:nvSpPr>
+        <p:spPr/>
+        <p:txBody>
+          <a:bodyPr/>
+          <a:lstStyle/>
+          <a:p>
+            <a:fld id="{639B228B-E4D6-40B8-B79B-9A0D26B7F84A}" type="slidenum">
+              <a:rPr lang="en-US" smtClean="0"/>
+              <a:pPr/>
+              <a:t>8</a:t>
+            </a:fld>
+            <a:endParaRPr lang="en-US" dirty="0"/>
+          </a:p>
+        </p:txBody>
+      </p:sp>
+      <p:pic>
+        <p:nvPicPr>
+          <p:cNvPr id="3074" name="Picture 2"/>
+          <p:cNvPicPr>
+            <a:picLocks noChangeAspect="1" noChangeArrowheads="1"/>
+          </p:cNvPicPr>
+          <p:nvPr/>
+        </p:nvPicPr>
+        <p:blipFill>
+          <a:blip r:embed="rId2">
+            <a:extLst>
+              <a:ext uri="{28A0092B-C50C-407E-A947-70E740481C1C}">
+                <a14:useLocalDpi xmlns:a14="http://schemas.microsoft.com/office/drawing/2010/main" val="0"/>
+              </a:ext>
+            </a:extLst>
+          </a:blip>
+          <a:srcRect/>
+          <a:stretch>
+            <a:fillRect/>
+          </a:stretch>
+        </p:blipFill>
+        <p:spPr bwMode="auto">
+          <a:xfrm>
+            <a:off x="1194920" y="3137364"/>
+            <a:ext cx="3654508" cy="3580064"/>
+          </a:xfrm>
+          <a:prstGeom prst="rect">
+            <a:avLst/>
+          </a:prstGeom>
+          <a:noFill/>
+          <a:ln>
+            <a:noFill/>
+          </a:ln>
+          <a:extLst>
+            <a:ext uri="{909E8E84-426E-40DD-AFC4-6F175D3DCCD1}">
+              <a14:hiddenFill xmlns:a14="http://schemas.microsoft.com/office/drawing/2010/main">
+                <a:solidFill>
+                  <a:schemeClr val="accent1"/>
+                </a:solidFill>
+              </a14:hiddenFill>
+            </a:ext>
+            <a:ext uri="{91240B29-F687-4F45-9708-019B960494DF}">
+              <a14:hiddenLine xmlns:a14="http://schemas.microsoft.com/office/drawing/2010/main" w="9525">
+                <a:solidFill>
+                  <a:schemeClr val="tx1"/>
+                </a:solidFill>
+                <a:miter lim="800000"/>
+                <a:headEnd/>
+                <a:tailEnd/>
+              </a14:hiddenLine>
+            </a:ext>
+          </a:extLst>
+        </p:spPr>
+      </p:pic>
+      <p:pic>
+        <p:nvPicPr>
+          <p:cNvPr id="3075" name="Picture 3"/>
+          <p:cNvPicPr>
+            <a:picLocks noChangeAspect="1" noChangeArrowheads="1"/>
+          </p:cNvPicPr>
+          <p:nvPr/>
+        </p:nvPicPr>
+        <p:blipFill>
+          <a:blip r:embed="rId3">
+            <a:extLst>
+              <a:ext uri="{28A0092B-C50C-407E-A947-70E740481C1C}">
+                <a14:useLocalDpi xmlns:a14="http://schemas.microsoft.com/office/drawing/2010/main" val="0"/>
+              </a:ext>
+            </a:extLst>
+          </a:blip>
+          <a:srcRect/>
+          <a:stretch>
+            <a:fillRect/>
+          </a:stretch>
+        </p:blipFill>
+        <p:spPr bwMode="auto">
+          <a:xfrm>
+            <a:off x="5105078" y="3137364"/>
+            <a:ext cx="3936247" cy="854769"/>
+          </a:xfrm>
+          <a:prstGeom prst="rect">
+            <a:avLst/>
+          </a:prstGeom>
+          <a:noFill/>
+          <a:ln>
+            <a:noFill/>
+          </a:ln>
+          <a:extLst>
+            <a:ext uri="{909E8E84-426E-40DD-AFC4-6F175D3DCCD1}">
+              <a14:hiddenFill xmlns:a14="http://schemas.microsoft.com/office/drawing/2010/main">
+                <a:solidFill>
+                  <a:schemeClr val="accent1"/>
+                </a:solidFill>
+              </a14:hiddenFill>
+            </a:ext>
+            <a:ext uri="{91240B29-F687-4F45-9708-019B960494DF}">
+              <a14:hiddenLine xmlns:a14="http://schemas.microsoft.com/office/drawing/2010/main" w="9525">
+                <a:solidFill>
+                  <a:schemeClr val="tx1"/>
+                </a:solidFill>
+                <a:miter lim="800000"/>
+                <a:headEnd/>
+                <a:tailEnd/>
+              </a14:hiddenLine>
+            </a:ext>
+          </a:extLst>
+        </p:spPr>
+      </p:pic>
+      <p:pic>
+        <p:nvPicPr>
+          <p:cNvPr id="3077" name="Picture 5"/>
+          <p:cNvPicPr>
+            <a:picLocks noChangeAspect="1" noChangeArrowheads="1"/>
+          </p:cNvPicPr>
+          <p:nvPr/>
+        </p:nvPicPr>
+        <p:blipFill>
+          <a:blip r:embed="rId4">
+            <a:extLst>
+              <a:ext uri="{28A0092B-C50C-407E-A947-70E740481C1C}">
+                <a14:useLocalDpi xmlns:a14="http://schemas.microsoft.com/office/drawing/2010/main" val="0"/>
+              </a:ext>
+            </a:extLst>
+          </a:blip>
+          <a:srcRect/>
+          <a:stretch>
+            <a:fillRect/>
+          </a:stretch>
+        </p:blipFill>
+        <p:spPr bwMode="auto">
+          <a:xfrm>
+            <a:off x="3262933" y="1229807"/>
+            <a:ext cx="3011413" cy="794054"/>
+          </a:xfrm>
+          <a:prstGeom prst="rect">
+            <a:avLst/>
+          </a:prstGeom>
+          <a:noFill/>
+          <a:ln>
+            <a:noFill/>
+          </a:ln>
+          <a:extLst>
+            <a:ext uri="{909E8E84-426E-40DD-AFC4-6F175D3DCCD1}">
+              <a14:hiddenFill xmlns:a14="http://schemas.microsoft.com/office/drawing/2010/main">
+                <a:solidFill>
+                  <a:schemeClr val="accent1"/>
+                </a:solidFill>
+              </a14:hiddenFill>
+            </a:ext>
+            <a:ext uri="{91240B29-F687-4F45-9708-019B960494DF}">
+              <a14:hiddenLine xmlns:a14="http://schemas.microsoft.com/office/drawing/2010/main" w="9525">
+                <a:solidFill>
+                  <a:schemeClr val="tx1"/>
+                </a:solidFill>
+                <a:miter lim="800000"/>
+                <a:headEnd/>
+                <a:tailEnd/>
+              </a14:hiddenLine>
+            </a:ext>
+          </a:extLst>
+        </p:spPr>
+      </p:pic>
+      <p:cxnSp>
+        <p:nvCxnSpPr>
+          <p:cNvPr id="5" name="Straight Arrow Connector 4"/>
+          <p:cNvCxnSpPr>
+            <a:endCxn id="3074" idx="0"/>
+          </p:cNvCxnSpPr>
+          <p:nvPr/>
+        </p:nvCxnSpPr>
+        <p:spPr>
+          <a:xfrm flipH="1">
+            <a:off x="3022174" y="1916832"/>
+            <a:ext cx="1379545" cy="1220532"/>
+          </a:xfrm>
+          <a:prstGeom prst="straightConnector1">
+            <a:avLst/>
+          </a:prstGeom>
+          <a:ln w="50800">
+            <a:solidFill>
+              <a:srgbClr val="F9A703"/>
+            </a:solidFill>
+            <a:tailEnd type="arrow"/>
+          </a:ln>
+        </p:spPr>
+        <p:style>
+          <a:lnRef idx="1">
+            <a:schemeClr val="accent1"/>
+          </a:lnRef>
+          <a:fillRef idx="0">
+            <a:schemeClr val="accent1"/>
+          </a:fillRef>
+          <a:effectRef idx="0">
+            <a:schemeClr val="accent1"/>
+          </a:effectRef>
+          <a:fontRef idx="minor">
+            <a:schemeClr val="tx1"/>
+          </a:fontRef>
+        </p:style>
+      </p:cxnSp>
+      <p:sp>
+        <p:nvSpPr>
+          <p:cNvPr id="8" name="Oval 7"/>
+          <p:cNvSpPr/>
+          <p:nvPr/>
+        </p:nvSpPr>
+        <p:spPr>
+          <a:xfrm>
+            <a:off x="4050040" y="1229807"/>
+            <a:ext cx="703359" cy="687025"/>
+          </a:xfrm>
+          <a:prstGeom prst="ellipse">
+            <a:avLst/>
+          </a:prstGeom>
+          <a:noFill/>
+          <a:ln w="50800">
+            <a:solidFill>
+              <a:srgbClr val="F9A703"/>
+            </a:solidFill>
+          </a:ln>
+        </p:spPr>
+        <p:style>
+          <a:lnRef idx="2">
+            <a:schemeClr val="accent1">
+              <a:shade val="50000"/>
+            </a:schemeClr>
+          </a:lnRef>
+          <a:fillRef idx="1">
+            <a:schemeClr val="accent1"/>
+          </a:fillRef>
+          <a:effectRef idx="0">
+            <a:schemeClr val="accent1"/>
+          </a:effectRef>
+          <a:fontRef idx="minor">
+            <a:schemeClr val="lt1"/>
+          </a:fontRef>
+        </p:style>
+        <p:txBody>
+          <a:bodyPr rtlCol="0" anchor="ctr"/>
+          <a:lstStyle/>
+          <a:p>
+            <a:pPr algn="ctr"/>
+            <a:endParaRPr lang="en-US"/>
+          </a:p>
+        </p:txBody>
+      </p:sp>
+      <p:sp>
+        <p:nvSpPr>
+          <p:cNvPr id="12" name="Oval 11"/>
+          <p:cNvSpPr/>
+          <p:nvPr/>
+        </p:nvSpPr>
+        <p:spPr>
+          <a:xfrm>
+            <a:off x="4753399" y="1229807"/>
+            <a:ext cx="703359" cy="687025"/>
+          </a:xfrm>
+          <a:prstGeom prst="ellipse">
+            <a:avLst/>
+          </a:prstGeom>
+          <a:noFill/>
+          <a:ln w="50800">
+            <a:solidFill>
+              <a:srgbClr val="3C536F"/>
+            </a:solidFill>
+          </a:ln>
+        </p:spPr>
+        <p:style>
+          <a:lnRef idx="2">
+            <a:schemeClr val="accent1">
+              <a:shade val="50000"/>
+            </a:schemeClr>
+          </a:lnRef>
+          <a:fillRef idx="1">
+            <a:schemeClr val="accent1"/>
+          </a:fillRef>
+          <a:effectRef idx="0">
+            <a:schemeClr val="accent1"/>
+          </a:effectRef>
+          <a:fontRef idx="minor">
+            <a:schemeClr val="lt1"/>
+          </a:fontRef>
+        </p:style>
+        <p:txBody>
+          <a:bodyPr rtlCol="0" anchor="ctr"/>
+          <a:lstStyle/>
+          <a:p>
+            <a:pPr algn="ctr"/>
+            <a:endParaRPr lang="en-US"/>
+          </a:p>
+        </p:txBody>
+      </p:sp>
+      <p:cxnSp>
+        <p:nvCxnSpPr>
+          <p:cNvPr id="13" name="Straight Arrow Connector 12"/>
+          <p:cNvCxnSpPr>
+            <a:stCxn id="12" idx="4"/>
+            <a:endCxn id="3075" idx="0"/>
+          </p:cNvCxnSpPr>
+          <p:nvPr/>
+        </p:nvCxnSpPr>
+        <p:spPr>
+          <a:xfrm>
+            <a:off x="5105079" y="1916832"/>
+            <a:ext cx="1968123" cy="1220532"/>
+          </a:xfrm>
+          <a:prstGeom prst="straightConnector1">
+            <a:avLst/>
+          </a:prstGeom>
+          <a:ln w="50800">
+            <a:solidFill>
+              <a:srgbClr val="3C536F"/>
+            </a:solidFill>
+            <a:tailEnd type="arrow"/>
+          </a:ln>
+        </p:spPr>
+        <p:style>
+          <a:lnRef idx="1">
+            <a:schemeClr val="accent1"/>
+          </a:lnRef>
+          <a:fillRef idx="0">
+            <a:schemeClr val="accent1"/>
+          </a:fillRef>
+          <a:effectRef idx="0">
+            <a:schemeClr val="accent1"/>
+          </a:effectRef>
+          <a:fontRef idx="minor">
+            <a:schemeClr val="tx1"/>
+          </a:fontRef>
+        </p:style>
+      </p:cxnSp>
+      <p:sp>
+        <p:nvSpPr>
+          <p:cNvPr id="17" name="Striped Right Arrow 16">
+            <a:hlinkClick r:id="rId5" action="ppaction://hlinksldjump"/>
+          </p:cNvPr>
+          <p:cNvSpPr/>
+          <p:nvPr/>
+        </p:nvSpPr>
+        <p:spPr>
+          <a:xfrm>
+            <a:off x="8460432" y="5949280"/>
+            <a:ext cx="288032" cy="261744"/>
+          </a:xfrm>
+          <a:prstGeom prst="stripedRightArrow">
+            <a:avLst/>
+          </a:prstGeom>
+          <a:solidFill>
+            <a:schemeClr val="bg2">
+              <a:lumMod val="50000"/>
+            </a:schemeClr>
+          </a:solidFill>
+          <a:ln>
+            <a:noFill/>
+          </a:ln>
+        </p:spPr>
+        <p:style>
+          <a:lnRef idx="2">
+            <a:schemeClr val="accent1">
+              <a:shade val="50000"/>
+            </a:schemeClr>
+          </a:lnRef>
+          <a:fillRef idx="1">
+            <a:schemeClr val="accent1"/>
+          </a:fillRef>
+          <a:effectRef idx="0">
+            <a:schemeClr val="accent1"/>
+          </a:effectRef>
+          <a:fontRef idx="minor">
+            <a:schemeClr val="lt1"/>
+          </a:fontRef>
+        </p:style>
+        <p:txBody>
+          <a:bodyPr rtlCol="0" anchor="ctr"/>
+          <a:lstStyle/>
+          <a:p>
+            <a:pPr algn="ctr"/>
+            <a:endParaRPr lang="en-US"/>
+          </a:p>
+        </p:txBody>
+      </p:sp>
+      <p:sp>
+        <p:nvSpPr>
+          <p:cNvPr id="18" name="Rounded Rectangle 17"/>
+          <p:cNvSpPr/>
+          <p:nvPr/>
+        </p:nvSpPr>
+        <p:spPr>
+          <a:xfrm>
+            <a:off x="141854" y="1376772"/>
+            <a:ext cx="2880320" cy="1584176"/>
+          </a:xfrm>
+          <a:prstGeom prst="roundRect">
+            <a:avLst/>
+          </a:prstGeom>
+          <a:pattFill prst="pct5">
+            <a:fgClr>
+              <a:srgbClr val="F9A703"/>
+            </a:fgClr>
+            <a:bgClr>
+              <a:schemeClr val="bg1"/>
+            </a:bgClr>
+          </a:pattFill>
+          <a:ln w="50800">
+            <a:solidFill>
+              <a:srgbClr val="F9A703"/>
+            </a:solidFill>
+          </a:ln>
+        </p:spPr>
+        <p:style>
+          <a:lnRef idx="2">
+            <a:schemeClr val="accent1">
+              <a:shade val="50000"/>
+            </a:schemeClr>
+          </a:lnRef>
+          <a:fillRef idx="1">
+            <a:schemeClr val="accent1"/>
+          </a:fillRef>
+          <a:effectRef idx="0">
+            <a:schemeClr val="accent1"/>
+          </a:effectRef>
+          <a:fontRef idx="minor">
+            <a:schemeClr val="lt1"/>
+          </a:fontRef>
+        </p:style>
+        <p:txBody>
+          <a:bodyPr rtlCol="0" anchor="ctr"/>
+          <a:lstStyle/>
+          <a:p>
+            <a:endParaRPr lang="en-US" b="1">
+              <a:solidFill>
+                <a:schemeClr val="accent2"/>
+              </a:solidFill>
+            </a:endParaRPr>
+          </a:p>
+        </p:txBody>
+      </p:sp>
+      <p:sp>
+        <p:nvSpPr>
+          <p:cNvPr id="19" name="TextBox 18"/>
+          <p:cNvSpPr txBox="1"/>
+          <p:nvPr/>
+        </p:nvSpPr>
+        <p:spPr>
+          <a:xfrm>
+            <a:off x="190223" y="1560024"/>
+            <a:ext cx="2757422" cy="1754326"/>
+          </a:xfrm>
+          <a:prstGeom prst="rect">
+            <a:avLst/>
+          </a:prstGeom>
+          <a:noFill/>
+        </p:spPr>
+        <p:txBody>
+          <a:bodyPr wrap="none" rtlCol="0">
+            <a:spAutoFit/>
+          </a:bodyPr>
+          <a:lstStyle/>
+          <a:p>
+            <a:r>
+              <a:rPr lang="en-US" b="1" dirty="0" smtClean="0"/>
+              <a:t>Request Management</a:t>
+            </a:r>
+          </a:p>
+          <a:p>
+            <a:pPr marL="285750" indent="-285750">
+              <a:buClr>
+                <a:srgbClr val="F9A703"/>
+              </a:buClr>
+              <a:buFont typeface="Wingdings" panose="05000000000000000000" pitchFamily="2" charset="2"/>
+              <a:buChar char="§"/>
+            </a:pPr>
+            <a:r>
+              <a:rPr lang="de-DE" dirty="0" smtClean="0"/>
+              <a:t>send </a:t>
+            </a:r>
+            <a:r>
+              <a:rPr lang="de-DE" dirty="0" err="1" smtClean="0"/>
+              <a:t>contact</a:t>
+            </a:r>
+            <a:r>
+              <a:rPr lang="de-DE" dirty="0" smtClean="0"/>
+              <a:t> </a:t>
+            </a:r>
+            <a:r>
+              <a:rPr lang="de-DE" dirty="0" err="1" smtClean="0"/>
+              <a:t>requests</a:t>
+            </a:r>
+            <a:endParaRPr lang="de-DE" dirty="0" smtClean="0"/>
+          </a:p>
+          <a:p>
+            <a:pPr marL="285750" indent="-285750">
+              <a:buClr>
+                <a:srgbClr val="F9A703"/>
+              </a:buClr>
+              <a:buFont typeface="Wingdings" panose="05000000000000000000" pitchFamily="2" charset="2"/>
+              <a:buChar char="§"/>
+            </a:pPr>
+            <a:r>
+              <a:rPr lang="de-DE" dirty="0" err="1" smtClean="0"/>
+              <a:t>receive</a:t>
+            </a:r>
+            <a:r>
+              <a:rPr lang="de-DE" dirty="0" smtClean="0"/>
+              <a:t> </a:t>
+            </a:r>
+            <a:r>
+              <a:rPr lang="de-DE" dirty="0" err="1" smtClean="0"/>
+              <a:t>contact</a:t>
+            </a:r>
+            <a:r>
+              <a:rPr lang="de-DE" dirty="0" smtClean="0"/>
+              <a:t> </a:t>
+            </a:r>
+            <a:r>
+              <a:rPr lang="de-DE" dirty="0" err="1" smtClean="0"/>
+              <a:t>requests</a:t>
+            </a:r>
+            <a:endParaRPr lang="de-DE" dirty="0" smtClean="0"/>
+          </a:p>
+          <a:p>
+            <a:pPr marL="285750" indent="-285750">
+              <a:buClr>
+                <a:srgbClr val="F9A703"/>
+              </a:buClr>
+              <a:buFont typeface="Wingdings" panose="05000000000000000000" pitchFamily="2" charset="2"/>
+              <a:buChar char="§"/>
+            </a:pPr>
+            <a:r>
+              <a:rPr lang="de-DE" dirty="0" err="1" smtClean="0"/>
+              <a:t>request</a:t>
+            </a:r>
+            <a:r>
+              <a:rPr lang="de-DE" dirty="0" smtClean="0"/>
+              <a:t> </a:t>
+            </a:r>
+            <a:r>
+              <a:rPr lang="de-DE" dirty="0" err="1" smtClean="0"/>
+              <a:t>overview</a:t>
+            </a:r>
+            <a:endParaRPr lang="en-US" dirty="0" smtClean="0"/>
+          </a:p>
+          <a:p>
+            <a:endParaRPr lang="en-US" dirty="0" smtClean="0"/>
+          </a:p>
+          <a:p>
+            <a:endParaRPr lang="en-US" dirty="0"/>
+          </a:p>
+        </p:txBody>
+      </p:sp>
+    </p:spTree>
+    <p:extLst>
+      <p:ext uri="{BB962C8B-B14F-4D97-AF65-F5344CB8AC3E}">
+        <p14:creationId xmlns:p14="http://schemas.microsoft.com/office/powerpoint/2010/main" val="504861898"/>
+      </p:ext>
+    </p:extLst>
+  </p:cSld>
+  <p:clrMapOvr>
+    <a:masterClrMapping/>
+  </p:clrMapOvr>
+  <p:timing>
+    <p:tnLst>
+      <p:par>
+        <p:cTn id="1" dur="indefinite" restart="never" nodeType="tmRoot"/>
+      </p:par>
+    </p:tnLst>
+  </p:timing>
+</p:sld>
+</file>
+
+<file path=ppt/slides/slide9.xml><?xml version="1.0" encoding="utf-8"?>
+<p:sld xmlns:a="http://schemas.openxmlformats.org/drawingml/2006/main" xmlns:r="http://schemas.openxmlformats.org/officeDocument/2006/relationships" xmlns:p="http://schemas.openxmlformats.org/presentationml/2006/main">
+  <p:cSld>
+    <p:spTree>
+      <p:nvGrpSpPr>
+        <p:cNvPr id="1" name=""/>
+        <p:cNvGrpSpPr/>
+        <p:nvPr/>
+      </p:nvGrpSpPr>
+      <p:grpSpPr>
+        <a:xfrm>
+          <a:off x="0" y="0"/>
+          <a:ext cx="0" cy="0"/>
+          <a:chOff x="0" y="0"/>
+          <a:chExt cx="0" cy="0"/>
+        </a:xfrm>
+      </p:grpSpPr>
+      <p:sp>
+        <p:nvSpPr>
+          <p:cNvPr id="2" name="Title 1"/>
+          <p:cNvSpPr>
+            <a:spLocks noGrp="1"/>
+          </p:cNvSpPr>
+          <p:nvPr>
+            <p:ph type="title"/>
+          </p:nvPr>
+        </p:nvSpPr>
+        <p:spPr/>
+        <p:txBody>
+          <a:bodyPr/>
+          <a:lstStyle/>
+          <a:p>
+            <a:r>
+              <a:rPr lang="en-US" dirty="0" smtClean="0"/>
+              <a:t>Contact Management</a:t>
+            </a:r>
+            <a:endParaRPr lang="en-US" dirty="0"/>
+          </a:p>
+        </p:txBody>
+      </p:sp>
+      <p:sp>
+        <p:nvSpPr>
+          <p:cNvPr id="4" name="Slide Number Placeholder 3"/>
+          <p:cNvSpPr>
+            <a:spLocks noGrp="1"/>
+          </p:cNvSpPr>
+          <p:nvPr>
+            <p:ph type="sldNum" sz="quarter" idx="12"/>
+          </p:nvPr>
+        </p:nvSpPr>
+        <p:spPr/>
+        <p:txBody>
+          <a:bodyPr/>
+          <a:lstStyle/>
+          <a:p>
+            <a:fld id="{639B228B-E4D6-40B8-B79B-9A0D26B7F84A}" type="slidenum">
+              <a:rPr lang="en-US" smtClean="0"/>
+              <a:pPr/>
+              <a:t>9</a:t>
+            </a:fld>
+            <a:endParaRPr lang="en-US" dirty="0"/>
+          </a:p>
+        </p:txBody>
+      </p:sp>
+      <p:grpSp>
+        <p:nvGrpSpPr>
+          <p:cNvPr id="16" name="Group 15"/>
+          <p:cNvGrpSpPr/>
+          <p:nvPr/>
+        </p:nvGrpSpPr>
+        <p:grpSpPr>
+          <a:xfrm>
+            <a:off x="3978424" y="1700808"/>
+            <a:ext cx="3761928" cy="3672408"/>
+            <a:chOff x="2034208" y="1700808"/>
+            <a:chExt cx="3761928" cy="3672408"/>
+          </a:xfrm>
+        </p:grpSpPr>
+        <p:pic>
+          <p:nvPicPr>
+            <p:cNvPr id="1026" name="Picture 2"/>
+            <p:cNvPicPr>
+              <a:picLocks noChangeAspect="1" noChangeArrowheads="1"/>
+            </p:cNvPicPr>
+            <p:nvPr/>
+          </p:nvPicPr>
+          <p:blipFill>
+            <a:blip r:embed="rId2">
+              <a:extLst>
+                <a:ext uri="{28A0092B-C50C-407E-A947-70E740481C1C}">
+                  <a14:useLocalDpi xmlns:a14="http://schemas.microsoft.com/office/drawing/2010/main" val="0"/>
+                </a:ext>
+              </a:extLst>
+            </a:blip>
+            <a:srcRect/>
+            <a:stretch>
+              <a:fillRect/>
+            </a:stretch>
+          </p:blipFill>
+          <p:spPr bwMode="auto">
+            <a:xfrm>
+              <a:off x="2094672" y="1772816"/>
+              <a:ext cx="3701464" cy="3600400"/>
+            </a:xfrm>
+            <a:prstGeom prst="rect">
+              <a:avLst/>
+            </a:prstGeom>
+            <a:noFill/>
+            <a:ln>
+              <a:noFill/>
+            </a:ln>
+            <a:extLst>
+              <a:ext uri="{909E8E84-426E-40DD-AFC4-6F175D3DCCD1}">
+                <a14:hiddenFill xmlns:a14="http://schemas.microsoft.com/office/drawing/2010/main">
+                  <a:solidFill>
+                    <a:schemeClr val="accent1"/>
+                  </a:solidFill>
+                </a14:hiddenFill>
+              </a:ext>
+              <a:ext uri="{91240B29-F687-4F45-9708-019B960494DF}">
+                <a14:hiddenLine xmlns:a14="http://schemas.microsoft.com/office/drawing/2010/main" w="9525">
+                  <a:solidFill>
+                    <a:schemeClr val="tx1"/>
+                  </a:solidFill>
+                  <a:miter lim="800000"/>
+                  <a:headEnd/>
+                  <a:tailEnd/>
+                </a14:hiddenLine>
+              </a:ext>
+            </a:extLst>
+          </p:spPr>
+        </p:pic>
+        <p:sp>
+          <p:nvSpPr>
+            <p:cNvPr id="6" name="Oval 5"/>
+            <p:cNvSpPr/>
+            <p:nvPr/>
+          </p:nvSpPr>
+          <p:spPr>
+            <a:xfrm>
+              <a:off x="2034208" y="1700808"/>
+              <a:ext cx="768072" cy="720080"/>
+            </a:xfrm>
+            <a:prstGeom prst="ellipse">
+              <a:avLst/>
+            </a:prstGeom>
+            <a:noFill/>
+            <a:ln w="50800">
+              <a:solidFill>
+                <a:srgbClr val="F9A703"/>
+              </a:solidFill>
+            </a:ln>
+          </p:spPr>
+          <p:style>
+            <a:lnRef idx="2">
+              <a:schemeClr val="accent1">
+                <a:shade val="50000"/>
+              </a:schemeClr>
+            </a:lnRef>
+            <a:fillRef idx="1">
+              <a:schemeClr val="accent1"/>
+            </a:fillRef>
+            <a:effectRef idx="0">
+              <a:schemeClr val="accent1"/>
+            </a:effectRef>
+            <a:fontRef idx="minor">
+              <a:schemeClr val="lt1"/>
+            </a:fontRef>
+          </p:style>
+          <p:txBody>
+            <a:bodyPr rtlCol="0" anchor="ctr"/>
+            <a:lstStyle/>
+            <a:p>
+              <a:pPr algn="ctr"/>
+              <a:endParaRPr lang="en-US"/>
+            </a:p>
+          </p:txBody>
+        </p:sp>
+        <p:cxnSp>
+          <p:nvCxnSpPr>
+            <p:cNvPr id="13" name="Straight Connector 12"/>
+            <p:cNvCxnSpPr/>
+            <p:nvPr/>
+          </p:nvCxnSpPr>
+          <p:spPr>
+            <a:xfrm>
+              <a:off x="2418244" y="2420888"/>
+              <a:ext cx="0" cy="864096"/>
+            </a:xfrm>
+            <a:prstGeom prst="line">
+              <a:avLst/>
+            </a:prstGeom>
+            <a:ln w="50800">
+              <a:solidFill>
+                <a:srgbClr val="F9A703"/>
+              </a:solidFill>
+            </a:ln>
+          </p:spPr>
+          <p:style>
+            <a:lnRef idx="1">
+              <a:schemeClr val="accent1"/>
+            </a:lnRef>
+            <a:fillRef idx="0">
+              <a:schemeClr val="accent1"/>
+            </a:fillRef>
+            <a:effectRef idx="0">
+              <a:schemeClr val="accent1"/>
+            </a:effectRef>
+            <a:fontRef idx="minor">
+              <a:schemeClr val="tx1"/>
+            </a:fontRef>
+          </p:style>
+        </p:cxnSp>
+        <p:cxnSp>
+          <p:nvCxnSpPr>
+            <p:cNvPr id="15" name="Straight Arrow Connector 14"/>
+            <p:cNvCxnSpPr/>
+            <p:nvPr/>
+          </p:nvCxnSpPr>
+          <p:spPr>
+            <a:xfrm>
+              <a:off x="2418244" y="3284984"/>
+              <a:ext cx="384036" cy="0"/>
+            </a:xfrm>
+            <a:prstGeom prst="straightConnector1">
+              <a:avLst/>
+            </a:prstGeom>
+            <a:ln w="50800">
+              <a:solidFill>
+                <a:srgbClr val="F9A703"/>
+              </a:solidFill>
+              <a:tailEnd type="arrow"/>
+            </a:ln>
+          </p:spPr>
+          <p:style>
+            <a:lnRef idx="1">
+              <a:schemeClr val="accent1"/>
+            </a:lnRef>
+            <a:fillRef idx="0">
+              <a:schemeClr val="accent1"/>
+            </a:fillRef>
+            <a:effectRef idx="0">
+              <a:schemeClr val="accent1"/>
+            </a:effectRef>
+            <a:fontRef idx="minor">
+              <a:schemeClr val="tx1"/>
+            </a:fontRef>
+          </p:style>
+        </p:cxnSp>
+      </p:grpSp>
+      <p:sp>
+        <p:nvSpPr>
+          <p:cNvPr id="17" name="Striped Right Arrow 16">
+            <a:hlinkClick r:id="rId3" action="ppaction://hlinksldjump"/>
+          </p:cNvPr>
+          <p:cNvSpPr/>
+          <p:nvPr/>
+        </p:nvSpPr>
+        <p:spPr>
+          <a:xfrm>
+            <a:off x="8460432" y="5949280"/>
+            <a:ext cx="288032" cy="261744"/>
+          </a:xfrm>
+          <a:prstGeom prst="stripedRightArrow">
+            <a:avLst/>
+          </a:prstGeom>
+          <a:solidFill>
+            <a:schemeClr val="bg2">
+              <a:lumMod val="50000"/>
+            </a:schemeClr>
+          </a:solidFill>
+          <a:ln>
+            <a:noFill/>
+          </a:ln>
+        </p:spPr>
+        <p:style>
+          <a:lnRef idx="2">
+            <a:schemeClr val="accent1">
+              <a:shade val="50000"/>
+            </a:schemeClr>
+          </a:lnRef>
+          <a:fillRef idx="1">
+            <a:schemeClr val="accent1"/>
+          </a:fillRef>
+          <a:effectRef idx="0">
+            <a:schemeClr val="accent1"/>
+          </a:effectRef>
+          <a:fontRef idx="minor">
+            <a:schemeClr val="lt1"/>
+          </a:fontRef>
+        </p:style>
+        <p:txBody>
+          <a:bodyPr rtlCol="0" anchor="ctr"/>
+          <a:lstStyle/>
+          <a:p>
+            <a:pPr algn="ctr"/>
+            <a:endParaRPr lang="en-US"/>
+          </a:p>
+        </p:txBody>
+      </p:sp>
+      <p:sp>
+        <p:nvSpPr>
+          <p:cNvPr id="18" name="Rounded Rectangle 17"/>
+          <p:cNvSpPr/>
+          <p:nvPr/>
+        </p:nvSpPr>
+        <p:spPr>
+          <a:xfrm>
+            <a:off x="587920" y="1567672"/>
+            <a:ext cx="2903960" cy="1584176"/>
+          </a:xfrm>
+          <a:prstGeom prst="roundRect">
+            <a:avLst/>
+          </a:prstGeom>
+          <a:pattFill prst="pct5">
+            <a:fgClr>
+              <a:srgbClr val="F9A703"/>
+            </a:fgClr>
+            <a:bgClr>
+              <a:schemeClr val="bg1"/>
+            </a:bgClr>
+          </a:pattFill>
+          <a:ln w="50800">
+            <a:solidFill>
+              <a:srgbClr val="F9A703"/>
+            </a:solidFill>
+          </a:ln>
+        </p:spPr>
+        <p:style>
+          <a:lnRef idx="2">
+            <a:schemeClr val="accent1">
+              <a:shade val="50000"/>
+            </a:schemeClr>
+          </a:lnRef>
+          <a:fillRef idx="1">
+            <a:schemeClr val="accent1"/>
+          </a:fillRef>
+          <a:effectRef idx="0">
+            <a:schemeClr val="accent1"/>
+          </a:effectRef>
+          <a:fontRef idx="minor">
+            <a:schemeClr val="lt1"/>
+          </a:fontRef>
+        </p:style>
+        <p:txBody>
+          <a:bodyPr rtlCol="0" anchor="ctr"/>
+          <a:lstStyle/>
+          <a:p>
+            <a:endParaRPr lang="en-US" b="1">
+              <a:solidFill>
+                <a:schemeClr val="accent2"/>
+              </a:solidFill>
+            </a:endParaRPr>
+          </a:p>
+        </p:txBody>
+      </p:sp>
+      <p:sp>
+        <p:nvSpPr>
+          <p:cNvPr id="19" name="TextBox 18"/>
+          <p:cNvSpPr txBox="1"/>
+          <p:nvPr/>
+        </p:nvSpPr>
+        <p:spPr>
+          <a:xfrm>
+            <a:off x="1000638" y="1567672"/>
+            <a:ext cx="2413931" cy="1477328"/>
+          </a:xfrm>
+          <a:prstGeom prst="rect">
+            <a:avLst/>
+          </a:prstGeom>
+          <a:noFill/>
+        </p:spPr>
+        <p:txBody>
+          <a:bodyPr wrap="none" rtlCol="0">
+            <a:spAutoFit/>
+          </a:bodyPr>
+          <a:lstStyle/>
+          <a:p>
+            <a:r>
+              <a:rPr lang="en-US" b="1" dirty="0" smtClean="0"/>
+              <a:t>Contact Management</a:t>
+            </a:r>
+          </a:p>
+          <a:p>
+            <a:pPr marL="285750" indent="-285750">
+              <a:buClr>
+                <a:srgbClr val="F9A703"/>
+              </a:buClr>
+              <a:buFont typeface="Wingdings" panose="05000000000000000000" pitchFamily="2" charset="2"/>
+              <a:buChar char="§"/>
+            </a:pPr>
+            <a:r>
+              <a:rPr lang="de-DE" dirty="0" err="1" smtClean="0"/>
+              <a:t>add</a:t>
+            </a:r>
+            <a:r>
+              <a:rPr lang="de-DE" dirty="0" smtClean="0"/>
+              <a:t> </a:t>
+            </a:r>
+            <a:r>
+              <a:rPr lang="de-DE" dirty="0" err="1" smtClean="0"/>
+              <a:t>contacts</a:t>
+            </a:r>
+            <a:endParaRPr lang="de-DE" dirty="0" smtClean="0"/>
+          </a:p>
+          <a:p>
+            <a:pPr marL="285750" indent="-285750">
+              <a:buClr>
+                <a:srgbClr val="F9A703"/>
+              </a:buClr>
+              <a:buFont typeface="Wingdings" panose="05000000000000000000" pitchFamily="2" charset="2"/>
+              <a:buChar char="§"/>
+            </a:pPr>
+            <a:r>
+              <a:rPr lang="de-DE" dirty="0" err="1" smtClean="0"/>
+              <a:t>delete</a:t>
+            </a:r>
+            <a:r>
+              <a:rPr lang="de-DE" dirty="0" smtClean="0"/>
+              <a:t> </a:t>
+            </a:r>
+            <a:r>
+              <a:rPr lang="de-DE" dirty="0" err="1" smtClean="0"/>
+              <a:t>contacts</a:t>
+            </a:r>
+            <a:endParaRPr lang="de-DE" dirty="0" smtClean="0"/>
+          </a:p>
+          <a:p>
+            <a:pPr marL="285750" indent="-285750">
+              <a:buClr>
+                <a:srgbClr val="F9A703"/>
+              </a:buClr>
+              <a:buFont typeface="Wingdings" panose="05000000000000000000" pitchFamily="2" charset="2"/>
+              <a:buChar char="§"/>
+            </a:pPr>
+            <a:r>
+              <a:rPr lang="de-DE" dirty="0" err="1" smtClean="0"/>
+              <a:t>view</a:t>
+            </a:r>
+            <a:r>
+              <a:rPr lang="de-DE" dirty="0" smtClean="0"/>
+              <a:t> </a:t>
+            </a:r>
+            <a:r>
+              <a:rPr lang="de-DE" dirty="0" err="1" smtClean="0"/>
+              <a:t>contact</a:t>
+            </a:r>
+            <a:r>
+              <a:rPr lang="de-DE" dirty="0" smtClean="0"/>
+              <a:t> </a:t>
+            </a:r>
+            <a:r>
+              <a:rPr lang="de-DE" dirty="0" err="1" smtClean="0"/>
+              <a:t>profiles</a:t>
+            </a:r>
+            <a:endParaRPr lang="en-US" dirty="0" smtClean="0"/>
+          </a:p>
+          <a:p>
+            <a:endParaRPr lang="en-US" dirty="0"/>
+          </a:p>
+        </p:txBody>
+      </p:sp>
+    </p:spTree>
+    <p:extLst>
+      <p:ext uri="{BB962C8B-B14F-4D97-AF65-F5344CB8AC3E}">
+        <p14:creationId xmlns:p14="http://schemas.microsoft.com/office/powerpoint/2010/main" val="2121140947"/>
       </p:ext>
     </p:extLst>
   </p:cSld>

</xml_diff>